<commit_message>
Completed first four lessons of python course and updated SQL project.
</commit_message>
<xml_diff>
--- a/SQL-Python-Git/SQL/SQL Project/SQL Project.pptx
+++ b/SQL-Python-Git/SQL/SQL Project/SQL Project.pptx
@@ -901,19 +901,72 @@
     </mc:Fallback>
   </mc:AlternateContent>
   <c:chart>
-    <c:autoTitleDeleted val="1"/>
+    <c:title>
+      <c:tx>
+        <c:rich>
+          <a:bodyPr rot="0" spcFirstLastPara="1" vertOverflow="ellipsis" vert="horz" wrap="square" anchor="ctr" anchorCtr="1"/>
+          <a:lstStyle/>
+          <a:p>
+            <a:pPr>
+              <a:defRPr sz="2160" b="1" i="0" u="none" strike="noStrike" kern="1200" baseline="0">
+                <a:solidFill>
+                  <a:schemeClr val="tx1">
+                    <a:lumMod val="65000"/>
+                    <a:lumOff val="35000"/>
+                  </a:schemeClr>
+                </a:solidFill>
+                <a:latin typeface="+mn-lt"/>
+                <a:ea typeface="+mn-ea"/>
+                <a:cs typeface="+mn-cs"/>
+              </a:defRPr>
+            </a:pPr>
+            <a:r>
+              <a:rPr lang="en-US" dirty="0"/>
+              <a:t>Rentals by Country</a:t>
+            </a:r>
+            <a:r>
+              <a:rPr lang="en-US" baseline="0" dirty="0"/>
+              <a:t> per </a:t>
+            </a:r>
+            <a:r>
+              <a:rPr lang="en-US" dirty="0"/>
+              <a:t>Month</a:t>
+            </a:r>
+          </a:p>
+        </c:rich>
+      </c:tx>
+      <c:overlay val="0"/>
+      <c:spPr>
+        <a:noFill/>
+        <a:ln>
+          <a:noFill/>
+        </a:ln>
+        <a:effectLst/>
+      </c:spPr>
+      <c:txPr>
+        <a:bodyPr rot="0" spcFirstLastPara="1" vertOverflow="ellipsis" vert="horz" wrap="square" anchor="ctr" anchorCtr="1"/>
+        <a:lstStyle/>
+        <a:p>
+          <a:pPr>
+            <a:defRPr sz="2160" b="1" i="0" u="none" strike="noStrike" kern="1200" baseline="0">
+              <a:solidFill>
+                <a:schemeClr val="tx1">
+                  <a:lumMod val="65000"/>
+                  <a:lumOff val="35000"/>
+                </a:schemeClr>
+              </a:solidFill>
+              <a:latin typeface="+mn-lt"/>
+              <a:ea typeface="+mn-ea"/>
+              <a:cs typeface="+mn-cs"/>
+            </a:defRPr>
+          </a:pPr>
+          <a:endParaRPr lang="en-US"/>
+        </a:p>
+      </c:txPr>
+    </c:title>
+    <c:autoTitleDeleted val="0"/>
     <c:plotArea>
-      <c:layout>
-        <c:manualLayout>
-          <c:layoutTarget val="inner"/>
-          <c:xMode val="edge"/>
-          <c:yMode val="edge"/>
-          <c:x val="7.7615675968728412E-2"/>
-          <c:y val="2.6039199967455899E-2"/>
-          <c:w val="0.90909798921842411"/>
-          <c:h val="0.78755214240582272"/>
-        </c:manualLayout>
-      </c:layout>
+      <c:layout/>
       <c:barChart>
         <c:barDir val="col"/>
         <c:grouping val="clustered"/>
@@ -1015,7 +1068,7 @@
           </c:val>
           <c:extLst>
             <c:ext xmlns:c16="http://schemas.microsoft.com/office/drawing/2014/chart" uri="{C3380CC4-5D6E-409C-BE32-E72D297353CC}">
-              <c16:uniqueId val="{00000000-7090-4CBB-A8EA-BA68C36F81CE}"/>
+              <c16:uniqueId val="{00000000-EAAA-426B-B91A-807CF8C51323}"/>
             </c:ext>
           </c:extLst>
         </c:ser>
@@ -1116,7 +1169,7 @@
           </c:val>
           <c:extLst>
             <c:ext xmlns:c16="http://schemas.microsoft.com/office/drawing/2014/chart" uri="{C3380CC4-5D6E-409C-BE32-E72D297353CC}">
-              <c16:uniqueId val="{00000001-7090-4CBB-A8EA-BA68C36F81CE}"/>
+              <c16:uniqueId val="{00000001-EAAA-426B-B91A-807CF8C51323}"/>
             </c:ext>
           </c:extLst>
         </c:ser>
@@ -1217,7 +1270,7 @@
           </c:val>
           <c:extLst>
             <c:ext xmlns:c16="http://schemas.microsoft.com/office/drawing/2014/chart" uri="{C3380CC4-5D6E-409C-BE32-E72D297353CC}">
-              <c16:uniqueId val="{00000002-7090-4CBB-A8EA-BA68C36F81CE}"/>
+              <c16:uniqueId val="{00000002-EAAA-426B-B91A-807CF8C51323}"/>
             </c:ext>
           </c:extLst>
         </c:ser>
@@ -1318,7 +1371,7 @@
           </c:val>
           <c:extLst>
             <c:ext xmlns:c16="http://schemas.microsoft.com/office/drawing/2014/chart" uri="{C3380CC4-5D6E-409C-BE32-E72D297353CC}">
-              <c16:uniqueId val="{00000003-7090-4CBB-A8EA-BA68C36F81CE}"/>
+              <c16:uniqueId val="{00000003-EAAA-426B-B91A-807CF8C51323}"/>
             </c:ext>
           </c:extLst>
         </c:ser>
@@ -1419,7 +1472,7 @@
           </c:val>
           <c:extLst>
             <c:ext xmlns:c16="http://schemas.microsoft.com/office/drawing/2014/chart" uri="{C3380CC4-5D6E-409C-BE32-E72D297353CC}">
-              <c16:uniqueId val="{00000004-7090-4CBB-A8EA-BA68C36F81CE}"/>
+              <c16:uniqueId val="{00000004-EAAA-426B-B91A-807CF8C51323}"/>
             </c:ext>
           </c:extLst>
         </c:ser>
@@ -1442,6 +1495,61 @@
         </c:scaling>
         <c:delete val="0"/>
         <c:axPos val="b"/>
+        <c:title>
+          <c:tx>
+            <c:rich>
+              <a:bodyPr rot="0" spcFirstLastPara="1" vertOverflow="ellipsis" vert="horz" wrap="square" anchor="ctr" anchorCtr="1"/>
+              <a:lstStyle/>
+              <a:p>
+                <a:pPr>
+                  <a:defRPr sz="1800" b="0" i="0" u="none" strike="noStrike" kern="1200" baseline="0">
+                    <a:solidFill>
+                      <a:schemeClr val="tx1">
+                        <a:lumMod val="65000"/>
+                        <a:lumOff val="35000"/>
+                      </a:schemeClr>
+                    </a:solidFill>
+                    <a:latin typeface="+mn-lt"/>
+                    <a:ea typeface="+mn-ea"/>
+                    <a:cs typeface="+mn-cs"/>
+                  </a:defRPr>
+                </a:pPr>
+                <a:r>
+                  <a:rPr lang="en-US"/>
+                  <a:t>Month</a:t>
+                </a:r>
+              </a:p>
+            </c:rich>
+          </c:tx>
+          <c:overlay val="0"/>
+          <c:spPr>
+            <a:noFill/>
+            <a:ln>
+              <a:noFill/>
+            </a:ln>
+            <a:effectLst/>
+          </c:spPr>
+          <c:txPr>
+            <a:bodyPr rot="0" spcFirstLastPara="1" vertOverflow="ellipsis" vert="horz" wrap="square" anchor="ctr" anchorCtr="1"/>
+            <a:lstStyle/>
+            <a:p>
+              <a:pPr>
+                <a:defRPr sz="1800" b="0" i="0" u="none" strike="noStrike" kern="1200" baseline="0">
+                  <a:solidFill>
+                    <a:schemeClr val="tx1">
+                      <a:lumMod val="65000"/>
+                      <a:lumOff val="35000"/>
+                    </a:schemeClr>
+                  </a:solidFill>
+                  <a:latin typeface="+mn-lt"/>
+                  <a:ea typeface="+mn-ea"/>
+                  <a:cs typeface="+mn-cs"/>
+                </a:defRPr>
+              </a:pPr>
+              <a:endParaRPr lang="en-US"/>
+            </a:p>
+          </c:txPr>
+        </c:title>
         <c:numFmt formatCode="d\-mmm" sourceLinked="1"/>
         <c:majorTickMark val="none"/>
         <c:minorTickMark val="none"/>
@@ -1493,20 +1601,61 @@
         </c:scaling>
         <c:delete val="0"/>
         <c:axPos val="l"/>
-        <c:majorGridlines>
+        <c:title>
+          <c:tx>
+            <c:rich>
+              <a:bodyPr rot="-5400000" spcFirstLastPara="1" vertOverflow="ellipsis" vert="horz" wrap="square" anchor="ctr" anchorCtr="1"/>
+              <a:lstStyle/>
+              <a:p>
+                <a:pPr>
+                  <a:defRPr sz="1800" b="0" i="0" u="none" strike="noStrike" kern="1200" baseline="0">
+                    <a:solidFill>
+                      <a:schemeClr val="tx1">
+                        <a:lumMod val="65000"/>
+                        <a:lumOff val="35000"/>
+                      </a:schemeClr>
+                    </a:solidFill>
+                    <a:latin typeface="+mn-lt"/>
+                    <a:ea typeface="+mn-ea"/>
+                    <a:cs typeface="+mn-cs"/>
+                  </a:defRPr>
+                </a:pPr>
+                <a:r>
+                  <a:rPr lang="en-US"/>
+                  <a:t>Number of Rentals</a:t>
+                </a:r>
+              </a:p>
+            </c:rich>
+          </c:tx>
+          <c:overlay val="0"/>
           <c:spPr>
-            <a:ln w="9525" cap="flat" cmpd="sng" algn="ctr">
-              <a:solidFill>
-                <a:schemeClr val="tx1">
-                  <a:lumMod val="15000"/>
-                  <a:lumOff val="85000"/>
-                </a:schemeClr>
-              </a:solidFill>
-              <a:round/>
+            <a:noFill/>
+            <a:ln>
+              <a:noFill/>
             </a:ln>
             <a:effectLst/>
           </c:spPr>
-        </c:majorGridlines>
+          <c:txPr>
+            <a:bodyPr rot="-5400000" spcFirstLastPara="1" vertOverflow="ellipsis" vert="horz" wrap="square" anchor="ctr" anchorCtr="1"/>
+            <a:lstStyle/>
+            <a:p>
+              <a:pPr>
+                <a:defRPr sz="1800" b="0" i="0" u="none" strike="noStrike" kern="1200" baseline="0">
+                  <a:solidFill>
+                    <a:schemeClr val="tx1">
+                      <a:lumMod val="65000"/>
+                      <a:lumOff val="35000"/>
+                    </a:schemeClr>
+                  </a:solidFill>
+                  <a:latin typeface="+mn-lt"/>
+                  <a:ea typeface="+mn-ea"/>
+                  <a:cs typeface="+mn-cs"/>
+                </a:defRPr>
+              </a:pPr>
+              <a:endParaRPr lang="en-US"/>
+            </a:p>
+          </c:txPr>
+        </c:title>
         <c:numFmt formatCode="General" sourceLinked="1"/>
         <c:majorTickMark val="none"/>
         <c:minorTickMark val="none"/>
@@ -1629,19 +1778,69 @@
     </mc:Fallback>
   </mc:AlternateContent>
   <c:chart>
-    <c:autoTitleDeleted val="1"/>
+    <c:title>
+      <c:tx>
+        <c:rich>
+          <a:bodyPr rot="0" spcFirstLastPara="1" vertOverflow="ellipsis" vert="horz" wrap="square" anchor="ctr" anchorCtr="1"/>
+          <a:lstStyle/>
+          <a:p>
+            <a:pPr>
+              <a:defRPr sz="2160" b="0" i="0" u="none" strike="noStrike" kern="1200" spc="0" baseline="0">
+                <a:solidFill>
+                  <a:schemeClr val="tx1">
+                    <a:lumMod val="65000"/>
+                    <a:lumOff val="35000"/>
+                  </a:schemeClr>
+                </a:solidFill>
+                <a:latin typeface="+mn-lt"/>
+                <a:ea typeface="+mn-ea"/>
+                <a:cs typeface="+mn-cs"/>
+              </a:defRPr>
+            </a:pPr>
+            <a:r>
+              <a:rPr lang="en-US" b="1" dirty="0"/>
+              <a:t>Top 10 Renters’ Rentals</a:t>
+            </a:r>
+            <a:r>
+              <a:rPr lang="en-US" b="1" baseline="0" dirty="0"/>
+              <a:t> per Month</a:t>
+            </a:r>
+            <a:endParaRPr lang="en-US" b="1" dirty="0"/>
+          </a:p>
+        </c:rich>
+      </c:tx>
+      <c:overlay val="0"/>
+      <c:spPr>
+        <a:noFill/>
+        <a:ln>
+          <a:noFill/>
+        </a:ln>
+        <a:effectLst/>
+      </c:spPr>
+      <c:txPr>
+        <a:bodyPr rot="0" spcFirstLastPara="1" vertOverflow="ellipsis" vert="horz" wrap="square" anchor="ctr" anchorCtr="1"/>
+        <a:lstStyle/>
+        <a:p>
+          <a:pPr>
+            <a:defRPr sz="2160" b="0" i="0" u="none" strike="noStrike" kern="1200" spc="0" baseline="0">
+              <a:solidFill>
+                <a:schemeClr val="tx1">
+                  <a:lumMod val="65000"/>
+                  <a:lumOff val="35000"/>
+                </a:schemeClr>
+              </a:solidFill>
+              <a:latin typeface="+mn-lt"/>
+              <a:ea typeface="+mn-ea"/>
+              <a:cs typeface="+mn-cs"/>
+            </a:defRPr>
+          </a:pPr>
+          <a:endParaRPr lang="en-US"/>
+        </a:p>
+      </c:txPr>
+    </c:title>
+    <c:autoTitleDeleted val="0"/>
     <c:plotArea>
-      <c:layout>
-        <c:manualLayout>
-          <c:layoutTarget val="inner"/>
-          <c:xMode val="edge"/>
-          <c:yMode val="edge"/>
-          <c:x val="7.3659710335460316E-2"/>
-          <c:y val="3.7997313402558068E-2"/>
-          <c:w val="0.8762467004081872"/>
-          <c:h val="0.6585769941473496"/>
-        </c:manualLayout>
-      </c:layout>
+      <c:layout/>
       <c:lineChart>
         <c:grouping val="standard"/>
         <c:varyColors val="0"/>
@@ -1728,7 +1927,7 @@
           <c:smooth val="0"/>
           <c:extLst>
             <c:ext xmlns:c16="http://schemas.microsoft.com/office/drawing/2014/chart" uri="{C3380CC4-5D6E-409C-BE32-E72D297353CC}">
-              <c16:uniqueId val="{00000000-25F5-4622-817B-1F800B7E8276}"/>
+              <c16:uniqueId val="{00000000-880A-49AD-81A2-C2D1E16E7028}"/>
             </c:ext>
           </c:extLst>
         </c:ser>
@@ -1815,7 +2014,7 @@
           <c:smooth val="0"/>
           <c:extLst>
             <c:ext xmlns:c16="http://schemas.microsoft.com/office/drawing/2014/chart" uri="{C3380CC4-5D6E-409C-BE32-E72D297353CC}">
-              <c16:uniqueId val="{00000001-25F5-4622-817B-1F800B7E8276}"/>
+              <c16:uniqueId val="{00000001-880A-49AD-81A2-C2D1E16E7028}"/>
             </c:ext>
           </c:extLst>
         </c:ser>
@@ -1902,7 +2101,7 @@
           <c:smooth val="0"/>
           <c:extLst>
             <c:ext xmlns:c16="http://schemas.microsoft.com/office/drawing/2014/chart" uri="{C3380CC4-5D6E-409C-BE32-E72D297353CC}">
-              <c16:uniqueId val="{00000002-25F5-4622-817B-1F800B7E8276}"/>
+              <c16:uniqueId val="{00000002-880A-49AD-81A2-C2D1E16E7028}"/>
             </c:ext>
           </c:extLst>
         </c:ser>
@@ -1989,7 +2188,7 @@
           <c:smooth val="0"/>
           <c:extLst>
             <c:ext xmlns:c16="http://schemas.microsoft.com/office/drawing/2014/chart" uri="{C3380CC4-5D6E-409C-BE32-E72D297353CC}">
-              <c16:uniqueId val="{00000003-25F5-4622-817B-1F800B7E8276}"/>
+              <c16:uniqueId val="{00000003-880A-49AD-81A2-C2D1E16E7028}"/>
             </c:ext>
           </c:extLst>
         </c:ser>
@@ -2076,7 +2275,7 @@
           <c:smooth val="0"/>
           <c:extLst>
             <c:ext xmlns:c16="http://schemas.microsoft.com/office/drawing/2014/chart" uri="{C3380CC4-5D6E-409C-BE32-E72D297353CC}">
-              <c16:uniqueId val="{00000004-25F5-4622-817B-1F800B7E8276}"/>
+              <c16:uniqueId val="{00000004-880A-49AD-81A2-C2D1E16E7028}"/>
             </c:ext>
           </c:extLst>
         </c:ser>
@@ -2163,7 +2362,7 @@
           <c:smooth val="0"/>
           <c:extLst>
             <c:ext xmlns:c16="http://schemas.microsoft.com/office/drawing/2014/chart" uri="{C3380CC4-5D6E-409C-BE32-E72D297353CC}">
-              <c16:uniqueId val="{00000005-25F5-4622-817B-1F800B7E8276}"/>
+              <c16:uniqueId val="{00000005-880A-49AD-81A2-C2D1E16E7028}"/>
             </c:ext>
           </c:extLst>
         </c:ser>
@@ -2256,7 +2455,7 @@
           <c:smooth val="0"/>
           <c:extLst>
             <c:ext xmlns:c16="http://schemas.microsoft.com/office/drawing/2014/chart" uri="{C3380CC4-5D6E-409C-BE32-E72D297353CC}">
-              <c16:uniqueId val="{00000006-25F5-4622-817B-1F800B7E8276}"/>
+              <c16:uniqueId val="{00000006-880A-49AD-81A2-C2D1E16E7028}"/>
             </c:ext>
           </c:extLst>
         </c:ser>
@@ -2349,7 +2548,7 @@
           <c:smooth val="0"/>
           <c:extLst>
             <c:ext xmlns:c16="http://schemas.microsoft.com/office/drawing/2014/chart" uri="{C3380CC4-5D6E-409C-BE32-E72D297353CC}">
-              <c16:uniqueId val="{00000007-25F5-4622-817B-1F800B7E8276}"/>
+              <c16:uniqueId val="{00000007-880A-49AD-81A2-C2D1E16E7028}"/>
             </c:ext>
           </c:extLst>
         </c:ser>
@@ -2442,7 +2641,7 @@
           <c:smooth val="0"/>
           <c:extLst>
             <c:ext xmlns:c16="http://schemas.microsoft.com/office/drawing/2014/chart" uri="{C3380CC4-5D6E-409C-BE32-E72D297353CC}">
-              <c16:uniqueId val="{00000008-25F5-4622-817B-1F800B7E8276}"/>
+              <c16:uniqueId val="{00000008-880A-49AD-81A2-C2D1E16E7028}"/>
             </c:ext>
           </c:extLst>
         </c:ser>
@@ -2535,7 +2734,7 @@
           <c:smooth val="0"/>
           <c:extLst>
             <c:ext xmlns:c16="http://schemas.microsoft.com/office/drawing/2014/chart" uri="{C3380CC4-5D6E-409C-BE32-E72D297353CC}">
-              <c16:uniqueId val="{00000009-25F5-4622-817B-1F800B7E8276}"/>
+              <c16:uniqueId val="{00000009-880A-49AD-81A2-C2D1E16E7028}"/>
             </c:ext>
           </c:extLst>
         </c:ser>
@@ -2559,6 +2758,61 @@
         </c:scaling>
         <c:delete val="0"/>
         <c:axPos val="b"/>
+        <c:title>
+          <c:tx>
+            <c:rich>
+              <a:bodyPr rot="0" spcFirstLastPara="1" vertOverflow="ellipsis" vert="horz" wrap="square" anchor="ctr" anchorCtr="1"/>
+              <a:lstStyle/>
+              <a:p>
+                <a:pPr>
+                  <a:defRPr sz="1800" b="0" i="0" u="none" strike="noStrike" kern="1200" baseline="0">
+                    <a:solidFill>
+                      <a:schemeClr val="tx1">
+                        <a:lumMod val="65000"/>
+                        <a:lumOff val="35000"/>
+                      </a:schemeClr>
+                    </a:solidFill>
+                    <a:latin typeface="+mn-lt"/>
+                    <a:ea typeface="+mn-ea"/>
+                    <a:cs typeface="+mn-cs"/>
+                  </a:defRPr>
+                </a:pPr>
+                <a:r>
+                  <a:rPr lang="en-US"/>
+                  <a:t>Month</a:t>
+                </a:r>
+              </a:p>
+            </c:rich>
+          </c:tx>
+          <c:overlay val="0"/>
+          <c:spPr>
+            <a:noFill/>
+            <a:ln>
+              <a:noFill/>
+            </a:ln>
+            <a:effectLst/>
+          </c:spPr>
+          <c:txPr>
+            <a:bodyPr rot="0" spcFirstLastPara="1" vertOverflow="ellipsis" vert="horz" wrap="square" anchor="ctr" anchorCtr="1"/>
+            <a:lstStyle/>
+            <a:p>
+              <a:pPr>
+                <a:defRPr sz="1800" b="0" i="0" u="none" strike="noStrike" kern="1200" baseline="0">
+                  <a:solidFill>
+                    <a:schemeClr val="tx1">
+                      <a:lumMod val="65000"/>
+                      <a:lumOff val="35000"/>
+                    </a:schemeClr>
+                  </a:solidFill>
+                  <a:latin typeface="+mn-lt"/>
+                  <a:ea typeface="+mn-ea"/>
+                  <a:cs typeface="+mn-cs"/>
+                </a:defRPr>
+              </a:pPr>
+              <a:endParaRPr lang="en-US"/>
+            </a:p>
+          </c:txPr>
+        </c:title>
         <c:numFmt formatCode="d\-mmm" sourceLinked="1"/>
         <c:majorTickMark val="none"/>
         <c:minorTickMark val="none"/>
@@ -2624,6 +2878,61 @@
             <a:effectLst/>
           </c:spPr>
         </c:majorGridlines>
+        <c:title>
+          <c:tx>
+            <c:rich>
+              <a:bodyPr rot="-5400000" spcFirstLastPara="1" vertOverflow="ellipsis" vert="horz" wrap="square" anchor="ctr" anchorCtr="1"/>
+              <a:lstStyle/>
+              <a:p>
+                <a:pPr>
+                  <a:defRPr sz="1800" b="0" i="0" u="none" strike="noStrike" kern="1200" baseline="0">
+                    <a:solidFill>
+                      <a:schemeClr val="tx1">
+                        <a:lumMod val="65000"/>
+                        <a:lumOff val="35000"/>
+                      </a:schemeClr>
+                    </a:solidFill>
+                    <a:latin typeface="+mn-lt"/>
+                    <a:ea typeface="+mn-ea"/>
+                    <a:cs typeface="+mn-cs"/>
+                  </a:defRPr>
+                </a:pPr>
+                <a:r>
+                  <a:rPr lang="en-US"/>
+                  <a:t>Number of Rentals</a:t>
+                </a:r>
+              </a:p>
+            </c:rich>
+          </c:tx>
+          <c:overlay val="0"/>
+          <c:spPr>
+            <a:noFill/>
+            <a:ln>
+              <a:noFill/>
+            </a:ln>
+            <a:effectLst/>
+          </c:spPr>
+          <c:txPr>
+            <a:bodyPr rot="-5400000" spcFirstLastPara="1" vertOverflow="ellipsis" vert="horz" wrap="square" anchor="ctr" anchorCtr="1"/>
+            <a:lstStyle/>
+            <a:p>
+              <a:pPr>
+                <a:defRPr sz="1800" b="0" i="0" u="none" strike="noStrike" kern="1200" baseline="0">
+                  <a:solidFill>
+                    <a:schemeClr val="tx1">
+                      <a:lumMod val="65000"/>
+                      <a:lumOff val="35000"/>
+                    </a:schemeClr>
+                  </a:solidFill>
+                  <a:latin typeface="+mn-lt"/>
+                  <a:ea typeface="+mn-ea"/>
+                  <a:cs typeface="+mn-cs"/>
+                </a:defRPr>
+              </a:pPr>
+              <a:endParaRPr lang="en-US"/>
+            </a:p>
+          </c:txPr>
+        </c:title>
         <c:numFmt formatCode="General" sourceLinked="1"/>
         <c:majorTickMark val="none"/>
         <c:minorTickMark val="none"/>
@@ -2746,7 +3055,67 @@
     </mc:Fallback>
   </mc:AlternateContent>
   <c:chart>
-    <c:autoTitleDeleted val="1"/>
+    <c:title>
+      <c:tx>
+        <c:rich>
+          <a:bodyPr rot="0" spcFirstLastPara="1" vertOverflow="ellipsis" vert="horz" wrap="square" anchor="ctr" anchorCtr="1"/>
+          <a:lstStyle/>
+          <a:p>
+            <a:pPr>
+              <a:defRPr sz="2160" b="0" i="0" u="none" strike="noStrike" kern="1200" spc="0" baseline="0">
+                <a:solidFill>
+                  <a:schemeClr val="tx1">
+                    <a:lumMod val="65000"/>
+                    <a:lumOff val="35000"/>
+                  </a:schemeClr>
+                </a:solidFill>
+                <a:latin typeface="+mn-lt"/>
+                <a:ea typeface="+mn-ea"/>
+                <a:cs typeface="+mn-cs"/>
+              </a:defRPr>
+            </a:pPr>
+            <a:r>
+              <a:rPr lang="en-US" b="1" dirty="0"/>
+              <a:t>Number</a:t>
+            </a:r>
+            <a:r>
+              <a:rPr lang="en-US" b="1" baseline="0" dirty="0"/>
+              <a:t> of Rentals in Quartiles by Rental Duration</a:t>
+            </a:r>
+            <a:endParaRPr lang="en-US" b="1" dirty="0"/>
+          </a:p>
+        </c:rich>
+      </c:tx>
+      <c:overlay val="0"/>
+      <c:spPr>
+        <a:noFill/>
+        <a:ln>
+          <a:noFill/>
+        </a:ln>
+        <a:effectLst/>
+      </c:spPr>
+      <c:txPr>
+        <a:bodyPr rot="0" spcFirstLastPara="1" vertOverflow="ellipsis" vert="horz" wrap="square" anchor="ctr" anchorCtr="1"/>
+        <a:lstStyle/>
+        <a:p>
+          <a:pPr>
+            <a:defRPr sz="2160" b="0" i="0" u="none" strike="noStrike" kern="1200" spc="0" baseline="0">
+              <a:solidFill>
+                <a:schemeClr val="tx1">
+                  <a:lumMod val="65000"/>
+                  <a:lumOff val="35000"/>
+                </a:schemeClr>
+              </a:solidFill>
+              <a:latin typeface="+mn-lt"/>
+              <a:ea typeface="+mn-ea"/>
+              <a:cs typeface="+mn-cs"/>
+            </a:defRPr>
+          </a:pPr>
+          <a:endParaRPr lang="en-US"/>
+        </a:p>
+      </c:txPr>
+    </c:title>
+    <c:autoTitleDeleted val="0"/>
     <c:plotArea>
       <c:layout/>
       <c:barChart>
@@ -2768,42 +3137,13 @@
             </c:strRef>
           </c:tx>
           <c:spPr>
-            <a:gradFill rotWithShape="1">
-              <a:gsLst>
-                <a:gs pos="0">
-                  <a:schemeClr val="accent1">
-                    <a:satMod val="103000"/>
-                    <a:lumMod val="102000"/>
-                    <a:tint val="94000"/>
-                  </a:schemeClr>
-                </a:gs>
-                <a:gs pos="50000">
-                  <a:schemeClr val="accent1">
-                    <a:satMod val="110000"/>
-                    <a:lumMod val="100000"/>
-                    <a:shade val="100000"/>
-                  </a:schemeClr>
-                </a:gs>
-                <a:gs pos="100000">
-                  <a:schemeClr val="accent1">
-                    <a:lumMod val="99000"/>
-                    <a:satMod val="120000"/>
-                    <a:shade val="78000"/>
-                  </a:schemeClr>
-                </a:gs>
-              </a:gsLst>
-              <a:lin ang="5400000" scaled="0"/>
-            </a:gradFill>
+            <a:solidFill>
+              <a:schemeClr val="accent1"/>
+            </a:solidFill>
             <a:ln>
               <a:noFill/>
             </a:ln>
-            <a:effectLst>
-              <a:outerShdw blurRad="57150" dist="19050" dir="5400000" algn="ctr" rotWithShape="0">
-                <a:srgbClr val="000000">
-                  <a:alpha val="63000"/>
-                </a:srgbClr>
-              </a:outerShdw>
-            </a:effectLst>
+            <a:effectLst/>
           </c:spPr>
           <c:invertIfNegative val="0"/>
           <c:dLbls>
@@ -2815,9 +3155,7 @@
               <a:effectLst/>
             </c:spPr>
             <c:txPr>
-              <a:bodyPr rot="0" spcFirstLastPara="1" vertOverflow="ellipsis" vert="horz" wrap="square" lIns="38100" tIns="19050" rIns="38100" bIns="19050" anchor="ctr" anchorCtr="1">
-                <a:spAutoFit/>
-              </a:bodyPr>
+              <a:bodyPr rot="0" spcFirstLastPara="1" vertOverflow="ellipsis" vert="horz" wrap="square" anchor="ctr" anchorCtr="1"/>
               <a:lstStyle/>
               <a:p>
                 <a:pPr>
@@ -2907,7 +3245,7 @@
           </c:val>
           <c:extLst>
             <c:ext xmlns:c16="http://schemas.microsoft.com/office/drawing/2014/chart" uri="{C3380CC4-5D6E-409C-BE32-E72D297353CC}">
-              <c16:uniqueId val="{00000000-1442-447C-9A6A-1C220268AC81}"/>
+              <c16:uniqueId val="{00000000-A55C-4D53-B94A-07785E95877C}"/>
             </c:ext>
           </c:extLst>
         </c:ser>
@@ -2926,42 +3264,13 @@
             </c:strRef>
           </c:tx>
           <c:spPr>
-            <a:gradFill rotWithShape="1">
-              <a:gsLst>
-                <a:gs pos="0">
-                  <a:schemeClr val="accent2">
-                    <a:satMod val="103000"/>
-                    <a:lumMod val="102000"/>
-                    <a:tint val="94000"/>
-                  </a:schemeClr>
-                </a:gs>
-                <a:gs pos="50000">
-                  <a:schemeClr val="accent2">
-                    <a:satMod val="110000"/>
-                    <a:lumMod val="100000"/>
-                    <a:shade val="100000"/>
-                  </a:schemeClr>
-                </a:gs>
-                <a:gs pos="100000">
-                  <a:schemeClr val="accent2">
-                    <a:lumMod val="99000"/>
-                    <a:satMod val="120000"/>
-                    <a:shade val="78000"/>
-                  </a:schemeClr>
-                </a:gs>
-              </a:gsLst>
-              <a:lin ang="5400000" scaled="0"/>
-            </a:gradFill>
+            <a:solidFill>
+              <a:schemeClr val="accent2"/>
+            </a:solidFill>
             <a:ln>
               <a:noFill/>
             </a:ln>
-            <a:effectLst>
-              <a:outerShdw blurRad="57150" dist="19050" dir="5400000" algn="ctr" rotWithShape="0">
-                <a:srgbClr val="000000">
-                  <a:alpha val="63000"/>
-                </a:srgbClr>
-              </a:outerShdw>
-            </a:effectLst>
+            <a:effectLst/>
           </c:spPr>
           <c:invertIfNegative val="0"/>
           <c:dLbls>
@@ -2973,9 +3282,7 @@
               <a:effectLst/>
             </c:spPr>
             <c:txPr>
-              <a:bodyPr rot="0" spcFirstLastPara="1" vertOverflow="ellipsis" vert="horz" wrap="square" lIns="38100" tIns="19050" rIns="38100" bIns="19050" anchor="ctr" anchorCtr="1">
-                <a:spAutoFit/>
-              </a:bodyPr>
+              <a:bodyPr rot="0" spcFirstLastPara="1" vertOverflow="ellipsis" vert="horz" wrap="square" anchor="ctr" anchorCtr="1"/>
               <a:lstStyle/>
               <a:p>
                 <a:pPr>
@@ -3065,7 +3372,7 @@
           </c:val>
           <c:extLst>
             <c:ext xmlns:c16="http://schemas.microsoft.com/office/drawing/2014/chart" uri="{C3380CC4-5D6E-409C-BE32-E72D297353CC}">
-              <c16:uniqueId val="{00000001-1442-447C-9A6A-1C220268AC81}"/>
+              <c16:uniqueId val="{00000001-A55C-4D53-B94A-07785E95877C}"/>
             </c:ext>
           </c:extLst>
         </c:ser>
@@ -3084,42 +3391,13 @@
             </c:strRef>
           </c:tx>
           <c:spPr>
-            <a:gradFill rotWithShape="1">
-              <a:gsLst>
-                <a:gs pos="0">
-                  <a:schemeClr val="accent3">
-                    <a:satMod val="103000"/>
-                    <a:lumMod val="102000"/>
-                    <a:tint val="94000"/>
-                  </a:schemeClr>
-                </a:gs>
-                <a:gs pos="50000">
-                  <a:schemeClr val="accent3">
-                    <a:satMod val="110000"/>
-                    <a:lumMod val="100000"/>
-                    <a:shade val="100000"/>
-                  </a:schemeClr>
-                </a:gs>
-                <a:gs pos="100000">
-                  <a:schemeClr val="accent3">
-                    <a:lumMod val="99000"/>
-                    <a:satMod val="120000"/>
-                    <a:shade val="78000"/>
-                  </a:schemeClr>
-                </a:gs>
-              </a:gsLst>
-              <a:lin ang="5400000" scaled="0"/>
-            </a:gradFill>
+            <a:solidFill>
+              <a:schemeClr val="accent3"/>
+            </a:solidFill>
             <a:ln>
               <a:noFill/>
             </a:ln>
-            <a:effectLst>
-              <a:outerShdw blurRad="57150" dist="19050" dir="5400000" algn="ctr" rotWithShape="0">
-                <a:srgbClr val="000000">
-                  <a:alpha val="63000"/>
-                </a:srgbClr>
-              </a:outerShdw>
-            </a:effectLst>
+            <a:effectLst/>
           </c:spPr>
           <c:invertIfNegative val="0"/>
           <c:dLbls>
@@ -3131,9 +3409,7 @@
               <a:effectLst/>
             </c:spPr>
             <c:txPr>
-              <a:bodyPr rot="0" spcFirstLastPara="1" vertOverflow="ellipsis" vert="horz" wrap="square" lIns="38100" tIns="19050" rIns="38100" bIns="19050" anchor="ctr" anchorCtr="1">
-                <a:spAutoFit/>
-              </a:bodyPr>
+              <a:bodyPr rot="0" spcFirstLastPara="1" vertOverflow="ellipsis" vert="horz" wrap="square" anchor="ctr" anchorCtr="1"/>
               <a:lstStyle/>
               <a:p>
                 <a:pPr>
@@ -3223,7 +3499,7 @@
           </c:val>
           <c:extLst>
             <c:ext xmlns:c16="http://schemas.microsoft.com/office/drawing/2014/chart" uri="{C3380CC4-5D6E-409C-BE32-E72D297353CC}">
-              <c16:uniqueId val="{00000002-1442-447C-9A6A-1C220268AC81}"/>
+              <c16:uniqueId val="{00000002-A55C-4D53-B94A-07785E95877C}"/>
             </c:ext>
           </c:extLst>
         </c:ser>
@@ -3242,42 +3518,13 @@
             </c:strRef>
           </c:tx>
           <c:spPr>
-            <a:gradFill rotWithShape="1">
-              <a:gsLst>
-                <a:gs pos="0">
-                  <a:schemeClr val="accent4">
-                    <a:satMod val="103000"/>
-                    <a:lumMod val="102000"/>
-                    <a:tint val="94000"/>
-                  </a:schemeClr>
-                </a:gs>
-                <a:gs pos="50000">
-                  <a:schemeClr val="accent4">
-                    <a:satMod val="110000"/>
-                    <a:lumMod val="100000"/>
-                    <a:shade val="100000"/>
-                  </a:schemeClr>
-                </a:gs>
-                <a:gs pos="100000">
-                  <a:schemeClr val="accent4">
-                    <a:lumMod val="99000"/>
-                    <a:satMod val="120000"/>
-                    <a:shade val="78000"/>
-                  </a:schemeClr>
-                </a:gs>
-              </a:gsLst>
-              <a:lin ang="5400000" scaled="0"/>
-            </a:gradFill>
+            <a:solidFill>
+              <a:schemeClr val="accent4"/>
+            </a:solidFill>
             <a:ln>
               <a:noFill/>
             </a:ln>
-            <a:effectLst>
-              <a:outerShdw blurRad="57150" dist="19050" dir="5400000" algn="ctr" rotWithShape="0">
-                <a:srgbClr val="000000">
-                  <a:alpha val="63000"/>
-                </a:srgbClr>
-              </a:outerShdw>
-            </a:effectLst>
+            <a:effectLst/>
           </c:spPr>
           <c:invertIfNegative val="0"/>
           <c:dLbls>
@@ -3289,9 +3536,7 @@
               <a:effectLst/>
             </c:spPr>
             <c:txPr>
-              <a:bodyPr rot="0" spcFirstLastPara="1" vertOverflow="ellipsis" vert="horz" wrap="square" lIns="38100" tIns="19050" rIns="38100" bIns="19050" anchor="ctr" anchorCtr="1">
-                <a:spAutoFit/>
-              </a:bodyPr>
+              <a:bodyPr rot="0" spcFirstLastPara="1" vertOverflow="ellipsis" vert="horz" wrap="square" anchor="ctr" anchorCtr="1"/>
               <a:lstStyle/>
               <a:p>
                 <a:pPr>
@@ -3381,7 +3626,7 @@
           </c:val>
           <c:extLst>
             <c:ext xmlns:c16="http://schemas.microsoft.com/office/drawing/2014/chart" uri="{C3380CC4-5D6E-409C-BE32-E72D297353CC}">
-              <c16:uniqueId val="{00000003-1442-447C-9A6A-1C220268AC81}"/>
+              <c16:uniqueId val="{00000003-A55C-4D53-B94A-07785E95877C}"/>
             </c:ext>
           </c:extLst>
         </c:ser>
@@ -3400,42 +3645,13 @@
             </c:strRef>
           </c:tx>
           <c:spPr>
-            <a:gradFill rotWithShape="1">
-              <a:gsLst>
-                <a:gs pos="0">
-                  <a:schemeClr val="accent5">
-                    <a:satMod val="103000"/>
-                    <a:lumMod val="102000"/>
-                    <a:tint val="94000"/>
-                  </a:schemeClr>
-                </a:gs>
-                <a:gs pos="50000">
-                  <a:schemeClr val="accent5">
-                    <a:satMod val="110000"/>
-                    <a:lumMod val="100000"/>
-                    <a:shade val="100000"/>
-                  </a:schemeClr>
-                </a:gs>
-                <a:gs pos="100000">
-                  <a:schemeClr val="accent5">
-                    <a:lumMod val="99000"/>
-                    <a:satMod val="120000"/>
-                    <a:shade val="78000"/>
-                  </a:schemeClr>
-                </a:gs>
-              </a:gsLst>
-              <a:lin ang="5400000" scaled="0"/>
-            </a:gradFill>
+            <a:solidFill>
+              <a:schemeClr val="accent5"/>
+            </a:solidFill>
             <a:ln>
               <a:noFill/>
             </a:ln>
-            <a:effectLst>
-              <a:outerShdw blurRad="57150" dist="19050" dir="5400000" algn="ctr" rotWithShape="0">
-                <a:srgbClr val="000000">
-                  <a:alpha val="63000"/>
-                </a:srgbClr>
-              </a:outerShdw>
-            </a:effectLst>
+            <a:effectLst/>
           </c:spPr>
           <c:invertIfNegative val="0"/>
           <c:dLbls>
@@ -3447,9 +3663,7 @@
               <a:effectLst/>
             </c:spPr>
             <c:txPr>
-              <a:bodyPr rot="0" spcFirstLastPara="1" vertOverflow="ellipsis" vert="horz" wrap="square" lIns="38100" tIns="19050" rIns="38100" bIns="19050" anchor="ctr" anchorCtr="1">
-                <a:spAutoFit/>
-              </a:bodyPr>
+              <a:bodyPr rot="0" spcFirstLastPara="1" vertOverflow="ellipsis" vert="horz" wrap="square" anchor="ctr" anchorCtr="1"/>
               <a:lstStyle/>
               <a:p>
                 <a:pPr>
@@ -3539,7 +3753,7 @@
           </c:val>
           <c:extLst>
             <c:ext xmlns:c16="http://schemas.microsoft.com/office/drawing/2014/chart" uri="{C3380CC4-5D6E-409C-BE32-E72D297353CC}">
-              <c16:uniqueId val="{00000004-1442-447C-9A6A-1C220268AC81}"/>
+              <c16:uniqueId val="{00000004-A55C-4D53-B94A-07785E95877C}"/>
             </c:ext>
           </c:extLst>
         </c:ser>
@@ -3558,42 +3772,13 @@
             </c:strRef>
           </c:tx>
           <c:spPr>
-            <a:gradFill rotWithShape="1">
-              <a:gsLst>
-                <a:gs pos="0">
-                  <a:schemeClr val="accent6">
-                    <a:satMod val="103000"/>
-                    <a:lumMod val="102000"/>
-                    <a:tint val="94000"/>
-                  </a:schemeClr>
-                </a:gs>
-                <a:gs pos="50000">
-                  <a:schemeClr val="accent6">
-                    <a:satMod val="110000"/>
-                    <a:lumMod val="100000"/>
-                    <a:shade val="100000"/>
-                  </a:schemeClr>
-                </a:gs>
-                <a:gs pos="100000">
-                  <a:schemeClr val="accent6">
-                    <a:lumMod val="99000"/>
-                    <a:satMod val="120000"/>
-                    <a:shade val="78000"/>
-                  </a:schemeClr>
-                </a:gs>
-              </a:gsLst>
-              <a:lin ang="5400000" scaled="0"/>
-            </a:gradFill>
+            <a:solidFill>
+              <a:schemeClr val="accent6"/>
+            </a:solidFill>
             <a:ln>
               <a:noFill/>
             </a:ln>
-            <a:effectLst>
-              <a:outerShdw blurRad="57150" dist="19050" dir="5400000" algn="ctr" rotWithShape="0">
-                <a:srgbClr val="000000">
-                  <a:alpha val="63000"/>
-                </a:srgbClr>
-              </a:outerShdw>
-            </a:effectLst>
+            <a:effectLst/>
           </c:spPr>
           <c:invertIfNegative val="0"/>
           <c:dLbls>
@@ -3605,9 +3790,7 @@
               <a:effectLst/>
             </c:spPr>
             <c:txPr>
-              <a:bodyPr rot="0" spcFirstLastPara="1" vertOverflow="ellipsis" vert="horz" wrap="square" lIns="38100" tIns="19050" rIns="38100" bIns="19050" anchor="ctr" anchorCtr="1">
-                <a:spAutoFit/>
-              </a:bodyPr>
+              <a:bodyPr rot="0" spcFirstLastPara="1" vertOverflow="ellipsis" vert="horz" wrap="square" anchor="ctr" anchorCtr="1"/>
               <a:lstStyle/>
               <a:p>
                 <a:pPr>
@@ -3697,7 +3880,7 @@
           </c:val>
           <c:extLst>
             <c:ext xmlns:c16="http://schemas.microsoft.com/office/drawing/2014/chart" uri="{C3380CC4-5D6E-409C-BE32-E72D297353CC}">
-              <c16:uniqueId val="{00000005-1442-447C-9A6A-1C220268AC81}"/>
+              <c16:uniqueId val="{00000005-A55C-4D53-B94A-07785E95877C}"/>
             </c:ext>
           </c:extLst>
         </c:ser>
@@ -3710,8 +3893,8 @@
           <c:showPercent val="0"/>
           <c:showBubbleSize val="0"/>
         </c:dLbls>
-        <c:gapWidth val="100"/>
-        <c:overlap val="-24"/>
+        <c:gapWidth val="219"/>
+        <c:overlap val="-27"/>
         <c:axId val="530894032"/>
         <c:axId val="530893712"/>
       </c:barChart>
@@ -3722,13 +3905,68 @@
         </c:scaling>
         <c:delete val="0"/>
         <c:axPos val="b"/>
+        <c:title>
+          <c:tx>
+            <c:rich>
+              <a:bodyPr rot="0" spcFirstLastPara="1" vertOverflow="ellipsis" vert="horz" wrap="square" anchor="ctr" anchorCtr="1"/>
+              <a:lstStyle/>
+              <a:p>
+                <a:pPr>
+                  <a:defRPr sz="1800" b="0" i="0" u="none" strike="noStrike" kern="1200" baseline="0">
+                    <a:solidFill>
+                      <a:schemeClr val="tx1">
+                        <a:lumMod val="65000"/>
+                        <a:lumOff val="35000"/>
+                      </a:schemeClr>
+                    </a:solidFill>
+                    <a:latin typeface="+mn-lt"/>
+                    <a:ea typeface="+mn-ea"/>
+                    <a:cs typeface="+mn-cs"/>
+                  </a:defRPr>
+                </a:pPr>
+                <a:r>
+                  <a:rPr lang="en-US"/>
+                  <a:t>Rental Quartiles by Rental Duration</a:t>
+                </a:r>
+              </a:p>
+            </c:rich>
+          </c:tx>
+          <c:overlay val="0"/>
+          <c:spPr>
+            <a:noFill/>
+            <a:ln>
+              <a:noFill/>
+            </a:ln>
+            <a:effectLst/>
+          </c:spPr>
+          <c:txPr>
+            <a:bodyPr rot="0" spcFirstLastPara="1" vertOverflow="ellipsis" vert="horz" wrap="square" anchor="ctr" anchorCtr="1"/>
+            <a:lstStyle/>
+            <a:p>
+              <a:pPr>
+                <a:defRPr sz="1800" b="0" i="0" u="none" strike="noStrike" kern="1200" baseline="0">
+                  <a:solidFill>
+                    <a:schemeClr val="tx1">
+                      <a:lumMod val="65000"/>
+                      <a:lumOff val="35000"/>
+                    </a:schemeClr>
+                  </a:solidFill>
+                  <a:latin typeface="+mn-lt"/>
+                  <a:ea typeface="+mn-ea"/>
+                  <a:cs typeface="+mn-cs"/>
+                </a:defRPr>
+              </a:pPr>
+              <a:endParaRPr lang="en-US"/>
+            </a:p>
+          </c:txPr>
+        </c:title>
         <c:numFmt formatCode="General" sourceLinked="1"/>
         <c:majorTickMark val="none"/>
         <c:minorTickMark val="none"/>
         <c:tickLblPos val="nextTo"/>
         <c:spPr>
           <a:noFill/>
-          <a:ln w="12700" cap="flat" cmpd="sng" algn="ctr">
+          <a:ln w="9525" cap="flat" cmpd="sng" algn="ctr">
             <a:solidFill>
               <a:schemeClr val="tx1">
                 <a:lumMod val="15000"/>
@@ -3787,6 +4025,61 @@
             <a:effectLst/>
           </c:spPr>
         </c:majorGridlines>
+        <c:title>
+          <c:tx>
+            <c:rich>
+              <a:bodyPr rot="-5400000" spcFirstLastPara="1" vertOverflow="ellipsis" vert="horz" wrap="square" anchor="ctr" anchorCtr="1"/>
+              <a:lstStyle/>
+              <a:p>
+                <a:pPr>
+                  <a:defRPr sz="1800" b="0" i="0" u="none" strike="noStrike" kern="1200" baseline="0">
+                    <a:solidFill>
+                      <a:schemeClr val="tx1">
+                        <a:lumMod val="65000"/>
+                        <a:lumOff val="35000"/>
+                      </a:schemeClr>
+                    </a:solidFill>
+                    <a:latin typeface="+mn-lt"/>
+                    <a:ea typeface="+mn-ea"/>
+                    <a:cs typeface="+mn-cs"/>
+                  </a:defRPr>
+                </a:pPr>
+                <a:r>
+                  <a:rPr lang="en-US"/>
+                  <a:t>Number of Rentals</a:t>
+                </a:r>
+              </a:p>
+            </c:rich>
+          </c:tx>
+          <c:overlay val="0"/>
+          <c:spPr>
+            <a:noFill/>
+            <a:ln>
+              <a:noFill/>
+            </a:ln>
+            <a:effectLst/>
+          </c:spPr>
+          <c:txPr>
+            <a:bodyPr rot="-5400000" spcFirstLastPara="1" vertOverflow="ellipsis" vert="horz" wrap="square" anchor="ctr" anchorCtr="1"/>
+            <a:lstStyle/>
+            <a:p>
+              <a:pPr>
+                <a:defRPr sz="1800" b="0" i="0" u="none" strike="noStrike" kern="1200" baseline="0">
+                  <a:solidFill>
+                    <a:schemeClr val="tx1">
+                      <a:lumMod val="65000"/>
+                      <a:lumOff val="35000"/>
+                    </a:schemeClr>
+                  </a:solidFill>
+                  <a:latin typeface="+mn-lt"/>
+                  <a:ea typeface="+mn-ea"/>
+                  <a:cs typeface="+mn-cs"/>
+                </a:defRPr>
+              </a:pPr>
+              <a:endParaRPr lang="en-US"/>
+            </a:p>
+          </c:txPr>
+        </c:title>
         <c:numFmt formatCode="General" sourceLinked="1"/>
         <c:majorTickMark val="none"/>
         <c:minorTickMark val="none"/>
@@ -3909,7 +4202,67 @@
     </mc:Fallback>
   </mc:AlternateContent>
   <c:chart>
-    <c:autoTitleDeleted val="1"/>
+    <c:title>
+      <c:tx>
+        <c:rich>
+          <a:bodyPr rot="0" spcFirstLastPara="1" vertOverflow="ellipsis" vert="horz" wrap="square" anchor="ctr" anchorCtr="1"/>
+          <a:lstStyle/>
+          <a:p>
+            <a:pPr>
+              <a:defRPr sz="2160" b="0" i="0" u="none" strike="noStrike" kern="1200" spc="0" baseline="0">
+                <a:solidFill>
+                  <a:schemeClr val="tx1">
+                    <a:lumMod val="65000"/>
+                    <a:lumOff val="35000"/>
+                  </a:schemeClr>
+                </a:solidFill>
+                <a:latin typeface="+mn-lt"/>
+                <a:ea typeface="+mn-ea"/>
+                <a:cs typeface="+mn-cs"/>
+              </a:defRPr>
+            </a:pPr>
+            <a:r>
+              <a:rPr lang="en-US" b="1" dirty="0"/>
+              <a:t>Number of Rentals by Store per</a:t>
+            </a:r>
+            <a:r>
+              <a:rPr lang="en-US" b="1" baseline="0" dirty="0"/>
+              <a:t> Month</a:t>
+            </a:r>
+            <a:endParaRPr lang="en-US" b="1" dirty="0"/>
+          </a:p>
+        </c:rich>
+      </c:tx>
+      <c:overlay val="0"/>
+      <c:spPr>
+        <a:noFill/>
+        <a:ln>
+          <a:noFill/>
+        </a:ln>
+        <a:effectLst/>
+      </c:spPr>
+      <c:txPr>
+        <a:bodyPr rot="0" spcFirstLastPara="1" vertOverflow="ellipsis" vert="horz" wrap="square" anchor="ctr" anchorCtr="1"/>
+        <a:lstStyle/>
+        <a:p>
+          <a:pPr>
+            <a:defRPr sz="2160" b="0" i="0" u="none" strike="noStrike" kern="1200" spc="0" baseline="0">
+              <a:solidFill>
+                <a:schemeClr val="tx1">
+                  <a:lumMod val="65000"/>
+                  <a:lumOff val="35000"/>
+                </a:schemeClr>
+              </a:solidFill>
+              <a:latin typeface="+mn-lt"/>
+              <a:ea typeface="+mn-ea"/>
+              <a:cs typeface="+mn-cs"/>
+            </a:defRPr>
+          </a:pPr>
+          <a:endParaRPr lang="en-US"/>
+        </a:p>
+      </c:txPr>
+    </c:title>
+    <c:autoTitleDeleted val="0"/>
     <c:plotArea>
       <c:layout/>
       <c:barChart>
@@ -3931,42 +4284,13 @@
             </c:strRef>
           </c:tx>
           <c:spPr>
-            <a:gradFill rotWithShape="1">
-              <a:gsLst>
-                <a:gs pos="0">
-                  <a:schemeClr val="accent1">
-                    <a:satMod val="103000"/>
-                    <a:lumMod val="102000"/>
-                    <a:tint val="94000"/>
-                  </a:schemeClr>
-                </a:gs>
-                <a:gs pos="50000">
-                  <a:schemeClr val="accent1">
-                    <a:satMod val="110000"/>
-                    <a:lumMod val="100000"/>
-                    <a:shade val="100000"/>
-                  </a:schemeClr>
-                </a:gs>
-                <a:gs pos="100000">
-                  <a:schemeClr val="accent1">
-                    <a:lumMod val="99000"/>
-                    <a:satMod val="120000"/>
-                    <a:shade val="78000"/>
-                  </a:schemeClr>
-                </a:gs>
-              </a:gsLst>
-              <a:lin ang="5400000" scaled="0"/>
-            </a:gradFill>
+            <a:solidFill>
+              <a:schemeClr val="accent1"/>
+            </a:solidFill>
             <a:ln>
               <a:noFill/>
             </a:ln>
-            <a:effectLst>
-              <a:outerShdw blurRad="57150" dist="19050" dir="5400000" algn="ctr" rotWithShape="0">
-                <a:srgbClr val="000000">
-                  <a:alpha val="63000"/>
-                </a:srgbClr>
-              </a:outerShdw>
-            </a:effectLst>
+            <a:effectLst/>
           </c:spPr>
           <c:invertIfNegative val="0"/>
           <c:cat>
@@ -4018,7 +4342,7 @@
           </c:val>
           <c:extLst>
             <c:ext xmlns:c16="http://schemas.microsoft.com/office/drawing/2014/chart" uri="{C3380CC4-5D6E-409C-BE32-E72D297353CC}">
-              <c16:uniqueId val="{00000000-3734-48D1-9BCE-85A414E35FE3}"/>
+              <c16:uniqueId val="{00000000-2A61-40AD-9783-1E1C40F0C2E6}"/>
             </c:ext>
           </c:extLst>
         </c:ser>
@@ -4037,42 +4361,13 @@
             </c:strRef>
           </c:tx>
           <c:spPr>
-            <a:gradFill rotWithShape="1">
-              <a:gsLst>
-                <a:gs pos="0">
-                  <a:schemeClr val="accent2">
-                    <a:satMod val="103000"/>
-                    <a:lumMod val="102000"/>
-                    <a:tint val="94000"/>
-                  </a:schemeClr>
-                </a:gs>
-                <a:gs pos="50000">
-                  <a:schemeClr val="accent2">
-                    <a:satMod val="110000"/>
-                    <a:lumMod val="100000"/>
-                    <a:shade val="100000"/>
-                  </a:schemeClr>
-                </a:gs>
-                <a:gs pos="100000">
-                  <a:schemeClr val="accent2">
-                    <a:lumMod val="99000"/>
-                    <a:satMod val="120000"/>
-                    <a:shade val="78000"/>
-                  </a:schemeClr>
-                </a:gs>
-              </a:gsLst>
-              <a:lin ang="5400000" scaled="0"/>
-            </a:gradFill>
+            <a:solidFill>
+              <a:schemeClr val="accent2"/>
+            </a:solidFill>
             <a:ln>
               <a:noFill/>
             </a:ln>
-            <a:effectLst>
-              <a:outerShdw blurRad="57150" dist="19050" dir="5400000" algn="ctr" rotWithShape="0">
-                <a:srgbClr val="000000">
-                  <a:alpha val="63000"/>
-                </a:srgbClr>
-              </a:outerShdw>
-            </a:effectLst>
+            <a:effectLst/>
           </c:spPr>
           <c:invertIfNegative val="0"/>
           <c:cat>
@@ -4124,7 +4419,7 @@
           </c:val>
           <c:extLst>
             <c:ext xmlns:c16="http://schemas.microsoft.com/office/drawing/2014/chart" uri="{C3380CC4-5D6E-409C-BE32-E72D297353CC}">
-              <c16:uniqueId val="{00000001-3734-48D1-9BCE-85A414E35FE3}"/>
+              <c16:uniqueId val="{00000001-2A61-40AD-9783-1E1C40F0C2E6}"/>
             </c:ext>
           </c:extLst>
         </c:ser>
@@ -4136,8 +4431,8 @@
           <c:showPercent val="0"/>
           <c:showBubbleSize val="0"/>
         </c:dLbls>
-        <c:gapWidth val="100"/>
-        <c:overlap val="-24"/>
+        <c:gapWidth val="219"/>
+        <c:overlap val="-27"/>
         <c:axId val="288670864"/>
         <c:axId val="288671504"/>
       </c:barChart>
@@ -4148,13 +4443,68 @@
         </c:scaling>
         <c:delete val="0"/>
         <c:axPos val="b"/>
+        <c:title>
+          <c:tx>
+            <c:rich>
+              <a:bodyPr rot="0" spcFirstLastPara="1" vertOverflow="ellipsis" vert="horz" wrap="square" anchor="ctr" anchorCtr="1"/>
+              <a:lstStyle/>
+              <a:p>
+                <a:pPr>
+                  <a:defRPr sz="1800" b="0" i="0" u="none" strike="noStrike" kern="1200" baseline="0">
+                    <a:solidFill>
+                      <a:schemeClr val="tx1">
+                        <a:lumMod val="65000"/>
+                        <a:lumOff val="35000"/>
+                      </a:schemeClr>
+                    </a:solidFill>
+                    <a:latin typeface="+mn-lt"/>
+                    <a:ea typeface="+mn-ea"/>
+                    <a:cs typeface="+mn-cs"/>
+                  </a:defRPr>
+                </a:pPr>
+                <a:r>
+                  <a:rPr lang="en-US"/>
+                  <a:t>Month</a:t>
+                </a:r>
+              </a:p>
+            </c:rich>
+          </c:tx>
+          <c:overlay val="0"/>
+          <c:spPr>
+            <a:noFill/>
+            <a:ln>
+              <a:noFill/>
+            </a:ln>
+            <a:effectLst/>
+          </c:spPr>
+          <c:txPr>
+            <a:bodyPr rot="0" spcFirstLastPara="1" vertOverflow="ellipsis" vert="horz" wrap="square" anchor="ctr" anchorCtr="1"/>
+            <a:lstStyle/>
+            <a:p>
+              <a:pPr>
+                <a:defRPr sz="1800" b="0" i="0" u="none" strike="noStrike" kern="1200" baseline="0">
+                  <a:solidFill>
+                    <a:schemeClr val="tx1">
+                      <a:lumMod val="65000"/>
+                      <a:lumOff val="35000"/>
+                    </a:schemeClr>
+                  </a:solidFill>
+                  <a:latin typeface="+mn-lt"/>
+                  <a:ea typeface="+mn-ea"/>
+                  <a:cs typeface="+mn-cs"/>
+                </a:defRPr>
+              </a:pPr>
+              <a:endParaRPr lang="en-US"/>
+            </a:p>
+          </c:txPr>
+        </c:title>
         <c:numFmt formatCode="General" sourceLinked="1"/>
         <c:majorTickMark val="none"/>
         <c:minorTickMark val="none"/>
         <c:tickLblPos val="nextTo"/>
         <c:spPr>
           <a:noFill/>
-          <a:ln w="12700" cap="flat" cmpd="sng" algn="ctr">
+          <a:ln w="9525" cap="flat" cmpd="sng" algn="ctr">
             <a:solidFill>
               <a:schemeClr val="tx1">
                 <a:lumMod val="15000"/>
@@ -4213,6 +4563,61 @@
             <a:effectLst/>
           </c:spPr>
         </c:majorGridlines>
+        <c:title>
+          <c:tx>
+            <c:rich>
+              <a:bodyPr rot="-5400000" spcFirstLastPara="1" vertOverflow="ellipsis" vert="horz" wrap="square" anchor="ctr" anchorCtr="1"/>
+              <a:lstStyle/>
+              <a:p>
+                <a:pPr>
+                  <a:defRPr sz="1800" b="0" i="0" u="none" strike="noStrike" kern="1200" baseline="0">
+                    <a:solidFill>
+                      <a:schemeClr val="tx1">
+                        <a:lumMod val="65000"/>
+                        <a:lumOff val="35000"/>
+                      </a:schemeClr>
+                    </a:solidFill>
+                    <a:latin typeface="+mn-lt"/>
+                    <a:ea typeface="+mn-ea"/>
+                    <a:cs typeface="+mn-cs"/>
+                  </a:defRPr>
+                </a:pPr>
+                <a:r>
+                  <a:rPr lang="en-US"/>
+                  <a:t>Number of Rentals</a:t>
+                </a:r>
+              </a:p>
+            </c:rich>
+          </c:tx>
+          <c:overlay val="0"/>
+          <c:spPr>
+            <a:noFill/>
+            <a:ln>
+              <a:noFill/>
+            </a:ln>
+            <a:effectLst/>
+          </c:spPr>
+          <c:txPr>
+            <a:bodyPr rot="-5400000" spcFirstLastPara="1" vertOverflow="ellipsis" vert="horz" wrap="square" anchor="ctr" anchorCtr="1"/>
+            <a:lstStyle/>
+            <a:p>
+              <a:pPr>
+                <a:defRPr sz="1800" b="0" i="0" u="none" strike="noStrike" kern="1200" baseline="0">
+                  <a:solidFill>
+                    <a:schemeClr val="tx1">
+                      <a:lumMod val="65000"/>
+                      <a:lumOff val="35000"/>
+                    </a:schemeClr>
+                  </a:solidFill>
+                  <a:latin typeface="+mn-lt"/>
+                  <a:ea typeface="+mn-ea"/>
+                  <a:cs typeface="+mn-cs"/>
+                </a:defRPr>
+              </a:pPr>
+              <a:endParaRPr lang="en-US"/>
+            </a:p>
+          </c:txPr>
+        </c:title>
         <c:numFmt formatCode="General" sourceLinked="1"/>
         <c:majorTickMark val="none"/>
         <c:minorTickMark val="none"/>
@@ -5487,7 +5892,7 @@
 </file>
 
 <file path=ppt/charts/style3.xml><?xml version="1.0" encoding="utf-8"?>
-<cs:chartStyle xmlns:cs="http://schemas.microsoft.com/office/drawing/2012/chartStyle" xmlns:a="http://schemas.openxmlformats.org/drawingml/2006/main" id="340">
+<cs:chartStyle xmlns:cs="http://schemas.microsoft.com/office/drawing/2012/chartStyle" xmlns:a="http://schemas.openxmlformats.org/drawingml/2006/main" id="201">
   <cs:axisTitle>
     <cs:lnRef idx="0"/>
     <cs:fillRef idx="0"/>
@@ -5498,7 +5903,7 @@
         <a:lumOff val="35000"/>
       </a:schemeClr>
     </cs:fontRef>
-    <cs:defRPr sz="1197" kern="1200"/>
+    <cs:defRPr sz="1000" kern="1200"/>
   </cs:axisTitle>
   <cs:categoryAxis>
     <cs:lnRef idx="0"/>
@@ -5511,7 +5916,7 @@
       </a:schemeClr>
     </cs:fontRef>
     <cs:spPr>
-      <a:ln w="12700" cap="flat" cmpd="sng" algn="ctr">
+      <a:ln w="9525" cap="flat" cmpd="sng" algn="ctr">
         <a:solidFill>
           <a:schemeClr val="tx1">
             <a:lumMod val="15000"/>
@@ -5521,14 +5926,14 @@
         <a:round/>
       </a:ln>
     </cs:spPr>
-    <cs:defRPr sz="1197" kern="1200"/>
+    <cs:defRPr sz="900" kern="1200"/>
   </cs:categoryAxis>
   <cs:chartArea mods="allowNoFillOverride allowNoLineOverride">
     <cs:lnRef idx="0"/>
     <cs:fillRef idx="0"/>
     <cs:effectRef idx="0"/>
     <cs:fontRef idx="minor">
-      <a:schemeClr val="tx2"/>
+      <a:schemeClr val="tx1"/>
     </cs:fontRef>
     <cs:spPr>
       <a:solidFill>
@@ -5544,7 +5949,7 @@
         <a:round/>
       </a:ln>
     </cs:spPr>
-    <cs:defRPr sz="1197" kern="1200"/>
+    <cs:defRPr sz="1000" kern="1200"/>
   </cs:chartArea>
   <cs:dataLabel>
     <cs:lnRef idx="0"/>
@@ -5556,7 +5961,7 @@
         <a:lumOff val="25000"/>
       </a:schemeClr>
     </cs:fontRef>
-    <cs:defRPr sz="1197" kern="1200"/>
+    <cs:defRPr sz="900" kern="1200"/>
   </cs:dataLabel>
   <cs:dataLabelCallout>
     <cs:lnRef idx="0"/>
@@ -5581,42 +5986,42 @@
         </a:solidFill>
       </a:ln>
     </cs:spPr>
-    <cs:defRPr sz="1197" kern="1200"/>
+    <cs:defRPr sz="900" kern="1200"/>
     <cs:bodyPr rot="0" spcFirstLastPara="1" vertOverflow="clip" horzOverflow="clip" vert="horz" wrap="square" lIns="36576" tIns="18288" rIns="36576" bIns="18288" anchor="ctr" anchorCtr="1">
       <a:spAutoFit/>
     </cs:bodyPr>
   </cs:dataLabelCallout>
   <cs:dataPoint>
     <cs:lnRef idx="0"/>
-    <cs:fillRef idx="3">
+    <cs:fillRef idx="1">
       <cs:styleClr val="auto"/>
     </cs:fillRef>
-    <cs:effectRef idx="3"/>
+    <cs:effectRef idx="0"/>
     <cs:fontRef idx="minor">
-      <a:schemeClr val="lt1"/>
+      <a:schemeClr val="tx1"/>
     </cs:fontRef>
   </cs:dataPoint>
   <cs:dataPoint3D>
     <cs:lnRef idx="0"/>
-    <cs:fillRef idx="3">
+    <cs:fillRef idx="1">
       <cs:styleClr val="auto"/>
     </cs:fillRef>
-    <cs:effectRef idx="3"/>
+    <cs:effectRef idx="0"/>
     <cs:fontRef idx="minor">
-      <a:schemeClr val="lt1"/>
+      <a:schemeClr val="tx1"/>
     </cs:fontRef>
   </cs:dataPoint3D>
   <cs:dataPointLine>
     <cs:lnRef idx="0">
       <cs:styleClr val="auto"/>
     </cs:lnRef>
-    <cs:fillRef idx="3"/>
-    <cs:effectRef idx="3"/>
+    <cs:fillRef idx="1"/>
+    <cs:effectRef idx="0"/>
     <cs:fontRef idx="minor">
-      <a:schemeClr val="lt1"/>
+      <a:schemeClr val="tx1"/>
     </cs:fontRef>
     <cs:spPr>
-      <a:ln w="34925" cap="rnd">
+      <a:ln w="28575" cap="rnd">
         <a:solidFill>
           <a:schemeClr val="phClr"/>
         </a:solidFill>
@@ -5628,31 +6033,30 @@
     <cs:lnRef idx="0">
       <cs:styleClr val="auto"/>
     </cs:lnRef>
-    <cs:fillRef idx="3">
+    <cs:fillRef idx="1">
       <cs:styleClr val="auto"/>
     </cs:fillRef>
-    <cs:effectRef idx="3"/>
+    <cs:effectRef idx="0"/>
     <cs:fontRef idx="minor">
-      <a:schemeClr val="lt1"/>
+      <a:schemeClr val="tx1"/>
     </cs:fontRef>
     <cs:spPr>
       <a:ln w="9525">
         <a:solidFill>
           <a:schemeClr val="phClr"/>
         </a:solidFill>
-        <a:round/>
       </a:ln>
     </cs:spPr>
   </cs:dataPointMarker>
-  <cs:dataPointMarkerLayout symbol="circle" size="6"/>
+  <cs:dataPointMarkerLayout symbol="circle" size="5"/>
   <cs:dataPointWireframe>
     <cs:lnRef idx="0">
       <cs:styleClr val="auto"/>
     </cs:lnRef>
-    <cs:fillRef idx="3"/>
-    <cs:effectRef idx="3"/>
+    <cs:fillRef idx="1"/>
+    <cs:effectRef idx="0"/>
     <cs:fontRef idx="minor">
-      <a:schemeClr val="lt1"/>
+      <a:schemeClr val="tx1"/>
     </cs:fontRef>
     <cs:spPr>
       <a:ln w="9525" cap="rnd">
@@ -5685,7 +6089,7 @@
         <a:round/>
       </a:ln>
     </cs:spPr>
-    <cs:defRPr sz="1197" kern="1200"/>
+    <cs:defRPr sz="900" kern="1200"/>
   </cs:dataTable>
   <cs:downBar>
     <cs:lnRef idx="0"/>
@@ -5754,8 +6158,14 @@
     <cs:fillRef idx="0"/>
     <cs:effectRef idx="0"/>
     <cs:fontRef idx="minor">
-      <a:schemeClr val="lt1"/>
+      <a:schemeClr val="tx1"/>
     </cs:fontRef>
+    <cs:spPr>
+      <a:noFill/>
+      <a:ln>
+        <a:noFill/>
+      </a:ln>
+    </cs:spPr>
   </cs:floor>
   <cs:gridlineMajor>
     <cs:lnRef idx="0"/>
@@ -5843,22 +6253,22 @@
         <a:lumOff val="35000"/>
       </a:schemeClr>
     </cs:fontRef>
-    <cs:defRPr sz="1197" kern="1200"/>
+    <cs:defRPr sz="900" kern="1200"/>
   </cs:legend>
-  <cs:plotArea>
+  <cs:plotArea mods="allowNoFillOverride allowNoLineOverride">
     <cs:lnRef idx="0"/>
     <cs:fillRef idx="0"/>
     <cs:effectRef idx="0"/>
     <cs:fontRef idx="minor">
-      <a:schemeClr val="lt1"/>
+      <a:schemeClr val="tx1"/>
     </cs:fontRef>
   </cs:plotArea>
-  <cs:plotArea3D>
+  <cs:plotArea3D mods="allowNoFillOverride allowNoLineOverride">
     <cs:lnRef idx="0"/>
     <cs:fillRef idx="0"/>
     <cs:effectRef idx="0"/>
     <cs:fontRef idx="minor">
-      <a:schemeClr val="lt1"/>
+      <a:schemeClr val="tx1"/>
     </cs:fontRef>
   </cs:plotArea3D>
   <cs:seriesAxis>
@@ -5871,18 +6281,7 @@
         <a:lumOff val="35000"/>
       </a:schemeClr>
     </cs:fontRef>
-    <cs:spPr>
-      <a:ln w="12700" cap="flat" cmpd="sng" algn="ctr">
-        <a:solidFill>
-          <a:schemeClr val="tx1">
-            <a:lumMod val="15000"/>
-            <a:lumOff val="85000"/>
-          </a:schemeClr>
-        </a:solidFill>
-        <a:round/>
-      </a:ln>
-    </cs:spPr>
-    <cs:defRPr sz="1197" kern="1200"/>
+    <cs:defRPr sz="900" kern="1200"/>
   </cs:seriesAxis>
   <cs:seriesLine>
     <cs:lnRef idx="0"/>
@@ -5913,7 +6312,7 @@
         <a:lumOff val="35000"/>
       </a:schemeClr>
     </cs:fontRef>
-    <cs:defRPr sz="2128" b="1" kern="1200" baseline="0"/>
+    <cs:defRPr sz="1400" b="0" kern="1200" spc="0" baseline="0"/>
   </cs:title>
   <cs:trendline>
     <cs:lnRef idx="0">
@@ -5922,13 +6321,14 @@
     <cs:fillRef idx="0"/>
     <cs:effectRef idx="0"/>
     <cs:fontRef idx="minor">
-      <a:schemeClr val="lt1"/>
+      <a:schemeClr val="tx1"/>
     </cs:fontRef>
     <cs:spPr>
       <a:ln w="19050" cap="rnd">
         <a:solidFill>
           <a:schemeClr val="phClr"/>
         </a:solidFill>
+        <a:prstDash val="sysDot"/>
       </a:ln>
     </cs:spPr>
   </cs:trendline>
@@ -5942,7 +6342,7 @@
         <a:lumOff val="35000"/>
       </a:schemeClr>
     </cs:fontRef>
-    <cs:defRPr sz="1197" kern="1200"/>
+    <cs:defRPr sz="900" kern="1200"/>
   </cs:trendlineLabel>
   <cs:upBar>
     <cs:lnRef idx="0"/>
@@ -5975,21 +6375,27 @@
         <a:lumOff val="35000"/>
       </a:schemeClr>
     </cs:fontRef>
-    <cs:defRPr sz="1197" kern="1200"/>
+    <cs:defRPr sz="900" kern="1200"/>
   </cs:valueAxis>
   <cs:wall>
     <cs:lnRef idx="0"/>
     <cs:fillRef idx="0"/>
     <cs:effectRef idx="0"/>
     <cs:fontRef idx="minor">
-      <a:schemeClr val="lt1"/>
+      <a:schemeClr val="tx1"/>
     </cs:fontRef>
+    <cs:spPr>
+      <a:noFill/>
+      <a:ln>
+        <a:noFill/>
+      </a:ln>
+    </cs:spPr>
   </cs:wall>
 </cs:chartStyle>
 </file>
 
 <file path=ppt/charts/style4.xml><?xml version="1.0" encoding="utf-8"?>
-<cs:chartStyle xmlns:cs="http://schemas.microsoft.com/office/drawing/2012/chartStyle" xmlns:a="http://schemas.openxmlformats.org/drawingml/2006/main" id="340">
+<cs:chartStyle xmlns:cs="http://schemas.microsoft.com/office/drawing/2012/chartStyle" xmlns:a="http://schemas.openxmlformats.org/drawingml/2006/main" id="201">
   <cs:axisTitle>
     <cs:lnRef idx="0"/>
     <cs:fillRef idx="0"/>
@@ -6000,7 +6406,7 @@
         <a:lumOff val="35000"/>
       </a:schemeClr>
     </cs:fontRef>
-    <cs:defRPr sz="1197" kern="1200"/>
+    <cs:defRPr sz="1000" kern="1200"/>
   </cs:axisTitle>
   <cs:categoryAxis>
     <cs:lnRef idx="0"/>
@@ -6013,7 +6419,7 @@
       </a:schemeClr>
     </cs:fontRef>
     <cs:spPr>
-      <a:ln w="12700" cap="flat" cmpd="sng" algn="ctr">
+      <a:ln w="9525" cap="flat" cmpd="sng" algn="ctr">
         <a:solidFill>
           <a:schemeClr val="tx1">
             <a:lumMod val="15000"/>
@@ -6023,14 +6429,14 @@
         <a:round/>
       </a:ln>
     </cs:spPr>
-    <cs:defRPr sz="1197" kern="1200"/>
+    <cs:defRPr sz="900" kern="1200"/>
   </cs:categoryAxis>
   <cs:chartArea mods="allowNoFillOverride allowNoLineOverride">
     <cs:lnRef idx="0"/>
     <cs:fillRef idx="0"/>
     <cs:effectRef idx="0"/>
     <cs:fontRef idx="minor">
-      <a:schemeClr val="tx2"/>
+      <a:schemeClr val="tx1"/>
     </cs:fontRef>
     <cs:spPr>
       <a:solidFill>
@@ -6046,7 +6452,7 @@
         <a:round/>
       </a:ln>
     </cs:spPr>
-    <cs:defRPr sz="1197" kern="1200"/>
+    <cs:defRPr sz="1000" kern="1200"/>
   </cs:chartArea>
   <cs:dataLabel>
     <cs:lnRef idx="0"/>
@@ -6058,7 +6464,7 @@
         <a:lumOff val="25000"/>
       </a:schemeClr>
     </cs:fontRef>
-    <cs:defRPr sz="1197" kern="1200"/>
+    <cs:defRPr sz="900" kern="1200"/>
   </cs:dataLabel>
   <cs:dataLabelCallout>
     <cs:lnRef idx="0"/>
@@ -6083,42 +6489,42 @@
         </a:solidFill>
       </a:ln>
     </cs:spPr>
-    <cs:defRPr sz="1197" kern="1200"/>
+    <cs:defRPr sz="900" kern="1200"/>
     <cs:bodyPr rot="0" spcFirstLastPara="1" vertOverflow="clip" horzOverflow="clip" vert="horz" wrap="square" lIns="36576" tIns="18288" rIns="36576" bIns="18288" anchor="ctr" anchorCtr="1">
       <a:spAutoFit/>
     </cs:bodyPr>
   </cs:dataLabelCallout>
   <cs:dataPoint>
     <cs:lnRef idx="0"/>
-    <cs:fillRef idx="3">
+    <cs:fillRef idx="1">
       <cs:styleClr val="auto"/>
     </cs:fillRef>
-    <cs:effectRef idx="3"/>
+    <cs:effectRef idx="0"/>
     <cs:fontRef idx="minor">
-      <a:schemeClr val="lt1"/>
+      <a:schemeClr val="tx1"/>
     </cs:fontRef>
   </cs:dataPoint>
   <cs:dataPoint3D>
     <cs:lnRef idx="0"/>
-    <cs:fillRef idx="3">
+    <cs:fillRef idx="1">
       <cs:styleClr val="auto"/>
     </cs:fillRef>
-    <cs:effectRef idx="3"/>
+    <cs:effectRef idx="0"/>
     <cs:fontRef idx="minor">
-      <a:schemeClr val="lt1"/>
+      <a:schemeClr val="tx1"/>
     </cs:fontRef>
   </cs:dataPoint3D>
   <cs:dataPointLine>
     <cs:lnRef idx="0">
       <cs:styleClr val="auto"/>
     </cs:lnRef>
-    <cs:fillRef idx="3"/>
-    <cs:effectRef idx="3"/>
+    <cs:fillRef idx="1"/>
+    <cs:effectRef idx="0"/>
     <cs:fontRef idx="minor">
-      <a:schemeClr val="lt1"/>
+      <a:schemeClr val="tx1"/>
     </cs:fontRef>
     <cs:spPr>
-      <a:ln w="34925" cap="rnd">
+      <a:ln w="28575" cap="rnd">
         <a:solidFill>
           <a:schemeClr val="phClr"/>
         </a:solidFill>
@@ -6130,31 +6536,30 @@
     <cs:lnRef idx="0">
       <cs:styleClr val="auto"/>
     </cs:lnRef>
-    <cs:fillRef idx="3">
+    <cs:fillRef idx="1">
       <cs:styleClr val="auto"/>
     </cs:fillRef>
-    <cs:effectRef idx="3"/>
+    <cs:effectRef idx="0"/>
     <cs:fontRef idx="minor">
-      <a:schemeClr val="lt1"/>
+      <a:schemeClr val="tx1"/>
     </cs:fontRef>
     <cs:spPr>
       <a:ln w="9525">
         <a:solidFill>
           <a:schemeClr val="phClr"/>
         </a:solidFill>
-        <a:round/>
       </a:ln>
     </cs:spPr>
   </cs:dataPointMarker>
-  <cs:dataPointMarkerLayout symbol="circle" size="6"/>
+  <cs:dataPointMarkerLayout symbol="circle" size="5"/>
   <cs:dataPointWireframe>
     <cs:lnRef idx="0">
       <cs:styleClr val="auto"/>
     </cs:lnRef>
-    <cs:fillRef idx="3"/>
-    <cs:effectRef idx="3"/>
+    <cs:fillRef idx="1"/>
+    <cs:effectRef idx="0"/>
     <cs:fontRef idx="minor">
-      <a:schemeClr val="lt1"/>
+      <a:schemeClr val="tx1"/>
     </cs:fontRef>
     <cs:spPr>
       <a:ln w="9525" cap="rnd">
@@ -6187,7 +6592,7 @@
         <a:round/>
       </a:ln>
     </cs:spPr>
-    <cs:defRPr sz="1197" kern="1200"/>
+    <cs:defRPr sz="900" kern="1200"/>
   </cs:dataTable>
   <cs:downBar>
     <cs:lnRef idx="0"/>
@@ -6256,8 +6661,14 @@
     <cs:fillRef idx="0"/>
     <cs:effectRef idx="0"/>
     <cs:fontRef idx="minor">
-      <a:schemeClr val="lt1"/>
+      <a:schemeClr val="tx1"/>
     </cs:fontRef>
+    <cs:spPr>
+      <a:noFill/>
+      <a:ln>
+        <a:noFill/>
+      </a:ln>
+    </cs:spPr>
   </cs:floor>
   <cs:gridlineMajor>
     <cs:lnRef idx="0"/>
@@ -6345,22 +6756,22 @@
         <a:lumOff val="35000"/>
       </a:schemeClr>
     </cs:fontRef>
-    <cs:defRPr sz="1197" kern="1200"/>
+    <cs:defRPr sz="900" kern="1200"/>
   </cs:legend>
-  <cs:plotArea>
+  <cs:plotArea mods="allowNoFillOverride allowNoLineOverride">
     <cs:lnRef idx="0"/>
     <cs:fillRef idx="0"/>
     <cs:effectRef idx="0"/>
     <cs:fontRef idx="minor">
-      <a:schemeClr val="lt1"/>
+      <a:schemeClr val="tx1"/>
     </cs:fontRef>
   </cs:plotArea>
-  <cs:plotArea3D>
+  <cs:plotArea3D mods="allowNoFillOverride allowNoLineOverride">
     <cs:lnRef idx="0"/>
     <cs:fillRef idx="0"/>
     <cs:effectRef idx="0"/>
     <cs:fontRef idx="minor">
-      <a:schemeClr val="lt1"/>
+      <a:schemeClr val="tx1"/>
     </cs:fontRef>
   </cs:plotArea3D>
   <cs:seriesAxis>
@@ -6373,18 +6784,7 @@
         <a:lumOff val="35000"/>
       </a:schemeClr>
     </cs:fontRef>
-    <cs:spPr>
-      <a:ln w="12700" cap="flat" cmpd="sng" algn="ctr">
-        <a:solidFill>
-          <a:schemeClr val="tx1">
-            <a:lumMod val="15000"/>
-            <a:lumOff val="85000"/>
-          </a:schemeClr>
-        </a:solidFill>
-        <a:round/>
-      </a:ln>
-    </cs:spPr>
-    <cs:defRPr sz="1197" kern="1200"/>
+    <cs:defRPr sz="900" kern="1200"/>
   </cs:seriesAxis>
   <cs:seriesLine>
     <cs:lnRef idx="0"/>
@@ -6415,7 +6815,7 @@
         <a:lumOff val="35000"/>
       </a:schemeClr>
     </cs:fontRef>
-    <cs:defRPr sz="2128" b="1" kern="1200" baseline="0"/>
+    <cs:defRPr sz="1400" b="0" kern="1200" spc="0" baseline="0"/>
   </cs:title>
   <cs:trendline>
     <cs:lnRef idx="0">
@@ -6424,13 +6824,14 @@
     <cs:fillRef idx="0"/>
     <cs:effectRef idx="0"/>
     <cs:fontRef idx="minor">
-      <a:schemeClr val="lt1"/>
+      <a:schemeClr val="tx1"/>
     </cs:fontRef>
     <cs:spPr>
       <a:ln w="19050" cap="rnd">
         <a:solidFill>
           <a:schemeClr val="phClr"/>
         </a:solidFill>
+        <a:prstDash val="sysDot"/>
       </a:ln>
     </cs:spPr>
   </cs:trendline>
@@ -6444,7 +6845,7 @@
         <a:lumOff val="35000"/>
       </a:schemeClr>
     </cs:fontRef>
-    <cs:defRPr sz="1197" kern="1200"/>
+    <cs:defRPr sz="900" kern="1200"/>
   </cs:trendlineLabel>
   <cs:upBar>
     <cs:lnRef idx="0"/>
@@ -6477,15 +6878,21 @@
         <a:lumOff val="35000"/>
       </a:schemeClr>
     </cs:fontRef>
-    <cs:defRPr sz="1197" kern="1200"/>
+    <cs:defRPr sz="900" kern="1200"/>
   </cs:valueAxis>
   <cs:wall>
     <cs:lnRef idx="0"/>
     <cs:fillRef idx="0"/>
     <cs:effectRef idx="0"/>
     <cs:fontRef idx="minor">
-      <a:schemeClr val="lt1"/>
+      <a:schemeClr val="tx1"/>
     </cs:fontRef>
+    <cs:spPr>
+      <a:noFill/>
+      <a:ln>
+        <a:noFill/>
+      </a:ln>
+    </cs:spPr>
   </cs:wall>
 </cs:chartStyle>
 </file>
@@ -6572,7 +6979,7 @@
           <a:p>
             <a:fld id="{5A2DF95C-7CEE-4347-B7B2-E5EAC84A9471}" type="datetimeFigureOut">
               <a:rPr lang="en-US" smtClean="0"/>
-              <a:t>11/16/2022</a:t>
+              <a:t>11/28/2022</a:t>
             </a:fld>
             <a:endParaRPr lang="en-US"/>
           </a:p>
@@ -21839,7 +22246,7 @@
           <a:p>
             <a:fld id="{CB0AF9BA-7ACD-47A8-A60E-333698111A7E}" type="datetime1">
               <a:rPr lang="en-US" smtClean="0"/>
-              <a:t>11/16/2022</a:t>
+              <a:t>11/28/2022</a:t>
             </a:fld>
             <a:endParaRPr lang="en-US"/>
           </a:p>
@@ -22037,7 +22444,7 @@
           <a:p>
             <a:fld id="{0861B72E-3036-4AB7-BB20-CC23A0C5F57C}" type="datetime1">
               <a:rPr lang="en-US" smtClean="0"/>
-              <a:t>11/16/2022</a:t>
+              <a:t>11/28/2022</a:t>
             </a:fld>
             <a:endParaRPr lang="en-US"/>
           </a:p>
@@ -22245,7 +22652,7 @@
           <a:p>
             <a:fld id="{29EC2C42-C32A-4754-99DB-AE886C6222DC}" type="datetime1">
               <a:rPr lang="en-US" smtClean="0"/>
-              <a:t>11/16/2022</a:t>
+              <a:t>11/28/2022</a:t>
             </a:fld>
             <a:endParaRPr lang="en-US"/>
           </a:p>
@@ -22443,7 +22850,7 @@
           <a:p>
             <a:fld id="{754F04B6-8201-4536-A947-BD8F442A2242}" type="datetime1">
               <a:rPr lang="en-US" smtClean="0"/>
-              <a:t>11/16/2022</a:t>
+              <a:t>11/28/2022</a:t>
             </a:fld>
             <a:endParaRPr lang="en-US"/>
           </a:p>
@@ -22718,7 +23125,7 @@
           <a:p>
             <a:fld id="{D6BF8B16-AC9B-446B-AF75-3D8E723283D4}" type="datetime1">
               <a:rPr lang="en-US" smtClean="0"/>
-              <a:t>11/16/2022</a:t>
+              <a:t>11/28/2022</a:t>
             </a:fld>
             <a:endParaRPr lang="en-US"/>
           </a:p>
@@ -22983,7 +23390,7 @@
           <a:p>
             <a:fld id="{E6CD7B70-31CD-41DE-B6D6-24C830063DB2}" type="datetime1">
               <a:rPr lang="en-US" smtClean="0"/>
-              <a:t>11/16/2022</a:t>
+              <a:t>11/28/2022</a:t>
             </a:fld>
             <a:endParaRPr lang="en-US"/>
           </a:p>
@@ -23395,7 +23802,7 @@
           <a:p>
             <a:fld id="{76D2BC6F-CF08-4D70-B1A3-79F796877ED2}" type="datetime1">
               <a:rPr lang="en-US" smtClean="0"/>
-              <a:t>11/16/2022</a:t>
+              <a:t>11/28/2022</a:t>
             </a:fld>
             <a:endParaRPr lang="en-US"/>
           </a:p>
@@ -23536,7 +23943,7 @@
           <a:p>
             <a:fld id="{FF8AE755-1D13-4897-8AC0-57616276ECDE}" type="datetime1">
               <a:rPr lang="en-US" smtClean="0"/>
-              <a:t>11/16/2022</a:t>
+              <a:t>11/28/2022</a:t>
             </a:fld>
             <a:endParaRPr lang="en-US"/>
           </a:p>
@@ -23649,7 +24056,7 @@
           <a:p>
             <a:fld id="{CF5FA909-9BFD-43B8-A2D4-B2333CCE9845}" type="datetime1">
               <a:rPr lang="en-US" smtClean="0"/>
-              <a:t>11/16/2022</a:t>
+              <a:t>11/28/2022</a:t>
             </a:fld>
             <a:endParaRPr lang="en-US"/>
           </a:p>
@@ -23960,7 +24367,7 @@
           <a:p>
             <a:fld id="{FC0C2199-BF42-46B9-BD41-63BB35B4D36A}" type="datetime1">
               <a:rPr lang="en-US" smtClean="0"/>
-              <a:t>11/16/2022</a:t>
+              <a:t>11/28/2022</a:t>
             </a:fld>
             <a:endParaRPr lang="en-US"/>
           </a:p>
@@ -24248,7 +24655,7 @@
           <a:p>
             <a:fld id="{10351437-15AE-4C92-8858-EA33D4A190C0}" type="datetime1">
               <a:rPr lang="en-US" smtClean="0"/>
-              <a:t>11/16/2022</a:t>
+              <a:t>11/28/2022</a:t>
             </a:fld>
             <a:endParaRPr lang="en-US"/>
           </a:p>
@@ -24489,7 +24896,7 @@
           <a:p>
             <a:fld id="{DB4E9E34-4C81-437F-903D-D4F963CC5ECE}" type="datetime1">
               <a:rPr lang="en-US" smtClean="0"/>
-              <a:t>11/16/2022</a:t>
+              <a:t>11/28/2022</a:t>
             </a:fld>
             <a:endParaRPr lang="en-US"/>
           </a:p>
@@ -25052,36 +25459,6 @@
           </a:p>
         </p:txBody>
       </p:sp>
-      <p:graphicFrame>
-        <p:nvGraphicFramePr>
-          <p:cNvPr id="2" name="Chart 1">
-            <a:extLst>
-              <a:ext uri="{FF2B5EF4-FFF2-40B4-BE49-F238E27FC236}">
-                <a16:creationId xmlns:a16="http://schemas.microsoft.com/office/drawing/2014/main" id="{980CAEB5-B5DF-578D-5C66-64FBB191729F}"/>
-              </a:ext>
-            </a:extLst>
-          </p:cNvPr>
-          <p:cNvGraphicFramePr>
-            <a:graphicFrameLocks/>
-          </p:cNvGraphicFramePr>
-          <p:nvPr>
-            <p:extLst>
-              <p:ext uri="{D42A27DB-BD31-4B8C-83A1-F6EECF244321}">
-                <p14:modId xmlns:p14="http://schemas.microsoft.com/office/powerpoint/2010/main" val="856428318"/>
-              </p:ext>
-            </p:extLst>
-          </p:nvPr>
-        </p:nvGraphicFramePr>
-        <p:xfrm>
-          <a:off x="0" y="1499118"/>
-          <a:ext cx="8602824" cy="5358882"/>
-        </p:xfrm>
-        <a:graphic>
-          <a:graphicData uri="http://schemas.openxmlformats.org/drawingml/2006/chart">
-            <c:chart xmlns:c="http://schemas.openxmlformats.org/drawingml/2006/chart" xmlns:r="http://schemas.openxmlformats.org/officeDocument/2006/relationships" r:id="rId3"/>
-          </a:graphicData>
-        </a:graphic>
-      </p:graphicFrame>
       <p:sp>
         <p:nvSpPr>
           <p:cNvPr id="5" name="TextBox 4">
@@ -25165,6 +25542,36 @@
           </a:p>
         </p:txBody>
       </p:sp>
+      <p:graphicFrame>
+        <p:nvGraphicFramePr>
+          <p:cNvPr id="3" name="Chart 2">
+            <a:extLst>
+              <a:ext uri="{FF2B5EF4-FFF2-40B4-BE49-F238E27FC236}">
+                <a16:creationId xmlns:a16="http://schemas.microsoft.com/office/drawing/2014/main" id="{980CAEB5-B5DF-578D-5C66-64FBB191729F}"/>
+              </a:ext>
+            </a:extLst>
+          </p:cNvPr>
+          <p:cNvGraphicFramePr>
+            <a:graphicFrameLocks/>
+          </p:cNvGraphicFramePr>
+          <p:nvPr>
+            <p:extLst>
+              <p:ext uri="{D42A27DB-BD31-4B8C-83A1-F6EECF244321}">
+                <p14:modId xmlns:p14="http://schemas.microsoft.com/office/powerpoint/2010/main" val="552060659"/>
+              </p:ext>
+            </p:extLst>
+          </p:nvPr>
+        </p:nvGraphicFramePr>
+        <p:xfrm>
+          <a:off x="132272" y="1592317"/>
+          <a:ext cx="8570295" cy="5108376"/>
+        </p:xfrm>
+        <a:graphic>
+          <a:graphicData uri="http://schemas.openxmlformats.org/drawingml/2006/chart">
+            <c:chart xmlns:c="http://schemas.openxmlformats.org/drawingml/2006/chart" xmlns:r="http://schemas.openxmlformats.org/officeDocument/2006/relationships" r:id="rId3"/>
+          </a:graphicData>
+        </a:graphic>
+      </p:graphicFrame>
     </p:spTree>
     <p:extLst>
       <p:ext uri="{BB962C8B-B14F-4D97-AF65-F5344CB8AC3E}">
@@ -25402,36 +25809,6 @@
           </a:p>
         </p:txBody>
       </p:sp>
-      <p:graphicFrame>
-        <p:nvGraphicFramePr>
-          <p:cNvPr id="3" name="Chart 2">
-            <a:extLst>
-              <a:ext uri="{FF2B5EF4-FFF2-40B4-BE49-F238E27FC236}">
-                <a16:creationId xmlns:a16="http://schemas.microsoft.com/office/drawing/2014/main" id="{5205054E-A4E8-C8B9-14B8-8F0C0DC079DF}"/>
-              </a:ext>
-            </a:extLst>
-          </p:cNvPr>
-          <p:cNvGraphicFramePr>
-            <a:graphicFrameLocks/>
-          </p:cNvGraphicFramePr>
-          <p:nvPr>
-            <p:extLst>
-              <p:ext uri="{D42A27DB-BD31-4B8C-83A1-F6EECF244321}">
-                <p14:modId xmlns:p14="http://schemas.microsoft.com/office/powerpoint/2010/main" val="1961146047"/>
-              </p:ext>
-            </p:extLst>
-          </p:nvPr>
-        </p:nvGraphicFramePr>
-        <p:xfrm>
-          <a:off x="-1" y="1472364"/>
-          <a:ext cx="8919714" cy="5385636"/>
-        </p:xfrm>
-        <a:graphic>
-          <a:graphicData uri="http://schemas.openxmlformats.org/drawingml/2006/chart">
-            <c:chart xmlns:c="http://schemas.openxmlformats.org/drawingml/2006/chart" xmlns:r="http://schemas.openxmlformats.org/officeDocument/2006/relationships" r:id="rId3"/>
-          </a:graphicData>
-        </a:graphic>
-      </p:graphicFrame>
       <p:sp>
         <p:nvSpPr>
           <p:cNvPr id="6" name="Slide Number Placeholder 5">
@@ -25466,6 +25843,36 @@
           </a:p>
         </p:txBody>
       </p:sp>
+      <p:graphicFrame>
+        <p:nvGraphicFramePr>
+          <p:cNvPr id="2" name="Chart 1">
+            <a:extLst>
+              <a:ext uri="{FF2B5EF4-FFF2-40B4-BE49-F238E27FC236}">
+                <a16:creationId xmlns:a16="http://schemas.microsoft.com/office/drawing/2014/main" id="{5205054E-A4E8-C8B9-14B8-8F0C0DC079DF}"/>
+              </a:ext>
+            </a:extLst>
+          </p:cNvPr>
+          <p:cNvGraphicFramePr>
+            <a:graphicFrameLocks/>
+          </p:cNvGraphicFramePr>
+          <p:nvPr>
+            <p:extLst>
+              <p:ext uri="{D42A27DB-BD31-4B8C-83A1-F6EECF244321}">
+                <p14:modId xmlns:p14="http://schemas.microsoft.com/office/powerpoint/2010/main" val="4189938884"/>
+              </p:ext>
+            </p:extLst>
+          </p:nvPr>
+        </p:nvGraphicFramePr>
+        <p:xfrm>
+          <a:off x="132271" y="1545018"/>
+          <a:ext cx="8787441" cy="5218386"/>
+        </p:xfrm>
+        <a:graphic>
+          <a:graphicData uri="http://schemas.openxmlformats.org/drawingml/2006/chart">
+            <c:chart xmlns:c="http://schemas.openxmlformats.org/drawingml/2006/chart" xmlns:r="http://schemas.openxmlformats.org/officeDocument/2006/relationships" r:id="rId3"/>
+          </a:graphicData>
+        </a:graphic>
+      </p:graphicFrame>
     </p:spTree>
     <p:extLst>
       <p:ext uri="{BB962C8B-B14F-4D97-AF65-F5344CB8AC3E}">
@@ -25676,36 +26083,6 @@
           </a:p>
         </p:txBody>
       </p:sp>
-      <p:graphicFrame>
-        <p:nvGraphicFramePr>
-          <p:cNvPr id="2" name="Chart 1">
-            <a:extLst>
-              <a:ext uri="{FF2B5EF4-FFF2-40B4-BE49-F238E27FC236}">
-                <a16:creationId xmlns:a16="http://schemas.microsoft.com/office/drawing/2014/main" id="{CAE29BE5-A332-384D-304F-CC876CCD264D}"/>
-              </a:ext>
-            </a:extLst>
-          </p:cNvPr>
-          <p:cNvGraphicFramePr>
-            <a:graphicFrameLocks/>
-          </p:cNvGraphicFramePr>
-          <p:nvPr>
-            <p:extLst>
-              <p:ext uri="{D42A27DB-BD31-4B8C-83A1-F6EECF244321}">
-                <p14:modId xmlns:p14="http://schemas.microsoft.com/office/powerpoint/2010/main" val="647944962"/>
-              </p:ext>
-            </p:extLst>
-          </p:nvPr>
-        </p:nvGraphicFramePr>
-        <p:xfrm>
-          <a:off x="0" y="1474238"/>
-          <a:ext cx="8621485" cy="5383762"/>
-        </p:xfrm>
-        <a:graphic>
-          <a:graphicData uri="http://schemas.openxmlformats.org/drawingml/2006/chart">
-            <c:chart xmlns:c="http://schemas.openxmlformats.org/drawingml/2006/chart" xmlns:r="http://schemas.openxmlformats.org/officeDocument/2006/relationships" r:id="rId3"/>
-          </a:graphicData>
-        </a:graphic>
-      </p:graphicFrame>
       <p:sp>
         <p:nvSpPr>
           <p:cNvPr id="6" name="Slide Number Placeholder 5">
@@ -25740,6 +26117,36 @@
           </a:p>
         </p:txBody>
       </p:sp>
+      <p:graphicFrame>
+        <p:nvGraphicFramePr>
+          <p:cNvPr id="3" name="Chart 2">
+            <a:extLst>
+              <a:ext uri="{FF2B5EF4-FFF2-40B4-BE49-F238E27FC236}">
+                <a16:creationId xmlns:a16="http://schemas.microsoft.com/office/drawing/2014/main" id="{CAE29BE5-A332-384D-304F-CC876CCD264D}"/>
+              </a:ext>
+            </a:extLst>
+          </p:cNvPr>
+          <p:cNvGraphicFramePr>
+            <a:graphicFrameLocks/>
+          </p:cNvGraphicFramePr>
+          <p:nvPr>
+            <p:extLst>
+              <p:ext uri="{D42A27DB-BD31-4B8C-83A1-F6EECF244321}">
+                <p14:modId xmlns:p14="http://schemas.microsoft.com/office/powerpoint/2010/main" val="3158387701"/>
+              </p:ext>
+            </p:extLst>
+          </p:nvPr>
+        </p:nvGraphicFramePr>
+        <p:xfrm>
+          <a:off x="0" y="1529255"/>
+          <a:ext cx="9033641" cy="5328745"/>
+        </p:xfrm>
+        <a:graphic>
+          <a:graphicData uri="http://schemas.openxmlformats.org/drawingml/2006/chart">
+            <c:chart xmlns:c="http://schemas.openxmlformats.org/drawingml/2006/chart" xmlns:r="http://schemas.openxmlformats.org/officeDocument/2006/relationships" r:id="rId3"/>
+          </a:graphicData>
+        </a:graphic>
+      </p:graphicFrame>
     </p:spTree>
     <p:extLst>
       <p:ext uri="{BB962C8B-B14F-4D97-AF65-F5344CB8AC3E}">
@@ -25950,36 +26357,6 @@
           </a:p>
         </p:txBody>
       </p:sp>
-      <p:graphicFrame>
-        <p:nvGraphicFramePr>
-          <p:cNvPr id="3" name="Chart 2">
-            <a:extLst>
-              <a:ext uri="{FF2B5EF4-FFF2-40B4-BE49-F238E27FC236}">
-                <a16:creationId xmlns:a16="http://schemas.microsoft.com/office/drawing/2014/main" id="{DB7DC765-F730-024C-CD64-B921AF58A862}"/>
-              </a:ext>
-            </a:extLst>
-          </p:cNvPr>
-          <p:cNvGraphicFramePr>
-            <a:graphicFrameLocks/>
-          </p:cNvGraphicFramePr>
-          <p:nvPr>
-            <p:extLst>
-              <p:ext uri="{D42A27DB-BD31-4B8C-83A1-F6EECF244321}">
-                <p14:modId xmlns:p14="http://schemas.microsoft.com/office/powerpoint/2010/main" val="1363656433"/>
-              </p:ext>
-            </p:extLst>
-          </p:nvPr>
-        </p:nvGraphicFramePr>
-        <p:xfrm>
-          <a:off x="-1" y="1690255"/>
-          <a:ext cx="8666019" cy="5167745"/>
-        </p:xfrm>
-        <a:graphic>
-          <a:graphicData uri="http://schemas.openxmlformats.org/drawingml/2006/chart">
-            <c:chart xmlns:c="http://schemas.openxmlformats.org/drawingml/2006/chart" xmlns:r="http://schemas.openxmlformats.org/officeDocument/2006/relationships" r:id="rId3"/>
-          </a:graphicData>
-        </a:graphic>
-      </p:graphicFrame>
       <p:sp>
         <p:nvSpPr>
           <p:cNvPr id="6" name="Slide Number Placeholder 5">
@@ -26014,6 +26391,36 @@
           </a:p>
         </p:txBody>
       </p:sp>
+      <p:graphicFrame>
+        <p:nvGraphicFramePr>
+          <p:cNvPr id="2" name="Chart 1">
+            <a:extLst>
+              <a:ext uri="{FF2B5EF4-FFF2-40B4-BE49-F238E27FC236}">
+                <a16:creationId xmlns:a16="http://schemas.microsoft.com/office/drawing/2014/main" id="{DB7DC765-F730-024C-CD64-B921AF58A862}"/>
+              </a:ext>
+            </a:extLst>
+          </p:cNvPr>
+          <p:cNvGraphicFramePr>
+            <a:graphicFrameLocks/>
+          </p:cNvGraphicFramePr>
+          <p:nvPr>
+            <p:extLst>
+              <p:ext uri="{D42A27DB-BD31-4B8C-83A1-F6EECF244321}">
+                <p14:modId xmlns:p14="http://schemas.microsoft.com/office/powerpoint/2010/main" val="3638706575"/>
+              </p:ext>
+            </p:extLst>
+          </p:nvPr>
+        </p:nvGraphicFramePr>
+        <p:xfrm>
+          <a:off x="0" y="1545022"/>
+          <a:ext cx="9049407" cy="5321266"/>
+        </p:xfrm>
+        <a:graphic>
+          <a:graphicData uri="http://schemas.openxmlformats.org/drawingml/2006/chart">
+            <c:chart xmlns:c="http://schemas.openxmlformats.org/drawingml/2006/chart" xmlns:r="http://schemas.openxmlformats.org/officeDocument/2006/relationships" r:id="rId3"/>
+          </a:graphicData>
+        </a:graphic>
+      </p:graphicFrame>
     </p:spTree>
     <p:extLst>
       <p:ext uri="{BB962C8B-B14F-4D97-AF65-F5344CB8AC3E}">

</xml_diff>